<commit_message>
updates Elodie 9/25/21 11:13am
</commit_message>
<xml_diff>
--- a/OpenWeather_AQI_Presentation_Final.pptx
+++ b/OpenWeather_AQI_Presentation_Final.pptx
@@ -6,7 +6,7 @@
     <p:sldMasterId id="2147483712" r:id="rId2"/>
   </p:sldMasterIdLst>
   <p:notesMasterIdLst>
-    <p:notesMasterId r:id="rId15"/>
+    <p:notesMasterId r:id="rId17"/>
   </p:notesMasterIdLst>
   <p:sldIdLst>
     <p:sldId id="256" r:id="rId3"/>
@@ -18,19 +18,21 @@
     <p:sldId id="262" r:id="rId9"/>
     <p:sldId id="263" r:id="rId10"/>
     <p:sldId id="264" r:id="rId11"/>
-    <p:sldId id="267" r:id="rId12"/>
-    <p:sldId id="265" r:id="rId13"/>
-    <p:sldId id="266" r:id="rId14"/>
+    <p:sldId id="269" r:id="rId12"/>
+    <p:sldId id="267" r:id="rId13"/>
+    <p:sldId id="268" r:id="rId14"/>
+    <p:sldId id="265" r:id="rId15"/>
+    <p:sldId id="266" r:id="rId16"/>
   </p:sldIdLst>
   <p:sldSz cx="9144000" cy="5143500" type="screen16x9"/>
   <p:notesSz cx="6858000" cy="9144000"/>
   <p:embeddedFontLst>
     <p:embeddedFont>
       <p:font typeface="Constantia" panose="02030602050306030303" pitchFamily="18" charset="0"/>
-      <p:regular r:id="rId16"/>
-      <p:bold r:id="rId17"/>
-      <p:italic r:id="rId18"/>
-      <p:boldItalic r:id="rId19"/>
+      <p:regular r:id="rId18"/>
+      <p:bold r:id="rId19"/>
+      <p:italic r:id="rId20"/>
+      <p:boldItalic r:id="rId21"/>
     </p:embeddedFont>
   </p:embeddedFontLst>
   <p:defaultTextStyle>
@@ -284,7 +286,7 @@
 <file path=ppt/revisionInfo.xml><?xml version="1.0" encoding="utf-8"?>
 <p1510:revInfo xmlns:a="http://schemas.openxmlformats.org/drawingml/2006/main" xmlns:r="http://schemas.openxmlformats.org/officeDocument/2006/relationships" xmlns:p1510="http://schemas.microsoft.com/office/powerpoint/2015/10/main">
   <p1510:revLst>
-    <p1510:client id="{79719C05-BB10-4FCC-B2CE-0EC3DC887679}" v="1" dt="2021-09-24T08:53:46.020"/>
+    <p1510:client id="{79719C05-BB10-4FCC-B2CE-0EC3DC887679}" v="4" dt="2021-09-25T15:05:48.707"/>
   </p1510:revLst>
 </p1510:revInfo>
 </file>
@@ -293,8 +295,8 @@
 <pc:chgInfo xmlns:a="http://schemas.openxmlformats.org/drawingml/2006/main" xmlns:r="http://schemas.openxmlformats.org/officeDocument/2006/relationships" xmlns:ac="http://schemas.microsoft.com/office/drawing/2013/main/command" xmlns:pc="http://schemas.microsoft.com/office/powerpoint/2013/main/command">
   <pc:docChgLst>
     <pc:chgData name="elodiecslawinski@gmail.com" userId="2d9956b1ce3ed99c" providerId="LiveId" clId="{79719C05-BB10-4FCC-B2CE-0EC3DC887679}"/>
-    <pc:docChg chg="undo redo custSel addSld modSld">
-      <pc:chgData name="elodiecslawinski@gmail.com" userId="2d9956b1ce3ed99c" providerId="LiveId" clId="{79719C05-BB10-4FCC-B2CE-0EC3DC887679}" dt="2021-09-25T13:43:42.702" v="199"/>
+    <pc:docChg chg="undo redo custSel addSld delSld modSld">
+      <pc:chgData name="elodiecslawinski@gmail.com" userId="2d9956b1ce3ed99c" providerId="LiveId" clId="{79719C05-BB10-4FCC-B2CE-0EC3DC887679}" dt="2021-09-25T15:12:34.635" v="1057" actId="1037"/>
       <pc:docMkLst>
         <pc:docMk/>
       </pc:docMkLst>
@@ -328,14 +330,22 @@
           </ac:spMkLst>
         </pc:spChg>
       </pc:sldChg>
-      <pc:sldChg chg="modSp mod">
-        <pc:chgData name="elodiecslawinski@gmail.com" userId="2d9956b1ce3ed99c" providerId="LiveId" clId="{79719C05-BB10-4FCC-B2CE-0EC3DC887679}" dt="2021-09-24T08:53:46.117" v="93" actId="27636"/>
+      <pc:sldChg chg="addSp delSp modSp mod">
+        <pc:chgData name="elodiecslawinski@gmail.com" userId="2d9956b1ce3ed99c" providerId="LiveId" clId="{79719C05-BB10-4FCC-B2CE-0EC3DC887679}" dt="2021-09-25T15:12:34.635" v="1057" actId="1037"/>
         <pc:sldMkLst>
           <pc:docMk/>
           <pc:sldMk cId="0" sldId="264"/>
         </pc:sldMkLst>
+        <pc:spChg chg="add mod">
+          <ac:chgData name="elodiecslawinski@gmail.com" userId="2d9956b1ce3ed99c" providerId="LiveId" clId="{79719C05-BB10-4FCC-B2CE-0EC3DC887679}" dt="2021-09-25T15:03:03.544" v="258" actId="20577"/>
+          <ac:spMkLst>
+            <pc:docMk/>
+            <pc:sldMk cId="0" sldId="264"/>
+            <ac:spMk id="2" creationId="{652A84E4-554A-4088-BEE6-1A777E8D4EA5}"/>
+          </ac:spMkLst>
+        </pc:spChg>
         <pc:spChg chg="mod">
-          <ac:chgData name="elodiecslawinski@gmail.com" userId="2d9956b1ce3ed99c" providerId="LiveId" clId="{79719C05-BB10-4FCC-B2CE-0EC3DC887679}" dt="2021-09-24T08:53:12.805" v="81" actId="20577"/>
+          <ac:chgData name="elodiecslawinski@gmail.com" userId="2d9956b1ce3ed99c" providerId="LiveId" clId="{79719C05-BB10-4FCC-B2CE-0EC3DC887679}" dt="2021-09-25T15:10:59.969" v="884" actId="20577"/>
           <ac:spMkLst>
             <pc:docMk/>
             <pc:sldMk cId="0" sldId="264"/>
@@ -343,13 +353,45 @@
           </ac:spMkLst>
         </pc:spChg>
         <pc:spChg chg="mod">
-          <ac:chgData name="elodiecslawinski@gmail.com" userId="2d9956b1ce3ed99c" providerId="LiveId" clId="{79719C05-BB10-4FCC-B2CE-0EC3DC887679}" dt="2021-09-24T08:53:46.117" v="93" actId="27636"/>
+          <ac:chgData name="elodiecslawinski@gmail.com" userId="2d9956b1ce3ed99c" providerId="LiveId" clId="{79719C05-BB10-4FCC-B2CE-0EC3DC887679}" dt="2021-09-25T15:11:55.519" v="1025" actId="404"/>
           <ac:spMkLst>
             <pc:docMk/>
             <pc:sldMk cId="0" sldId="264"/>
             <ac:spMk id="465" creationId="{00000000-0000-0000-0000-000000000000}"/>
           </ac:spMkLst>
         </pc:spChg>
+        <pc:spChg chg="mod">
+          <ac:chgData name="elodiecslawinski@gmail.com" userId="2d9956b1ce3ed99c" providerId="LiveId" clId="{79719C05-BB10-4FCC-B2CE-0EC3DC887679}" dt="2021-09-25T15:05:38.163" v="345" actId="1038"/>
+          <ac:spMkLst>
+            <pc:docMk/>
+            <pc:sldMk cId="0" sldId="264"/>
+            <ac:spMk id="466" creationId="{00000000-0000-0000-0000-000000000000}"/>
+          </ac:spMkLst>
+        </pc:spChg>
+        <pc:picChg chg="add del mod">
+          <ac:chgData name="elodiecslawinski@gmail.com" userId="2d9956b1ce3ed99c" providerId="LiveId" clId="{79719C05-BB10-4FCC-B2CE-0EC3DC887679}" dt="2021-09-25T15:12:05.050" v="1026" actId="478"/>
+          <ac:picMkLst>
+            <pc:docMk/>
+            <pc:sldMk cId="0" sldId="264"/>
+            <ac:picMk id="4" creationId="{B29FA1EC-E4F3-4546-B034-BC2CAFC5F270}"/>
+          </ac:picMkLst>
+        </pc:picChg>
+        <pc:picChg chg="add mod">
+          <ac:chgData name="elodiecslawinski@gmail.com" userId="2d9956b1ce3ed99c" providerId="LiveId" clId="{79719C05-BB10-4FCC-B2CE-0EC3DC887679}" dt="2021-09-25T15:12:34.635" v="1057" actId="1037"/>
+          <ac:picMkLst>
+            <pc:docMk/>
+            <pc:sldMk cId="0" sldId="264"/>
+            <ac:picMk id="6" creationId="{0E4E9D4A-B67D-48C4-B79D-BE2B6474CD46}"/>
+          </ac:picMkLst>
+        </pc:picChg>
+        <pc:picChg chg="del">
+          <ac:chgData name="elodiecslawinski@gmail.com" userId="2d9956b1ce3ed99c" providerId="LiveId" clId="{79719C05-BB10-4FCC-B2CE-0EC3DC887679}" dt="2021-09-25T15:03:06.966" v="259" actId="478"/>
+          <ac:picMkLst>
+            <pc:docMk/>
+            <pc:sldMk cId="0" sldId="264"/>
+            <ac:picMk id="467" creationId="{00000000-0000-0000-0000-000000000000}"/>
+          </ac:picMkLst>
+        </pc:picChg>
       </pc:sldChg>
       <pc:sldChg chg="addSp delSp modSp mod modNotesTx">
         <pc:chgData name="elodiecslawinski@gmail.com" userId="2d9956b1ce3ed99c" providerId="LiveId" clId="{79719C05-BB10-4FCC-B2CE-0EC3DC887679}" dt="2021-09-24T08:55:00.892" v="185" actId="20577"/>
@@ -430,7 +472,102 @@
         </pc:spChg>
       </pc:sldChg>
       <pc:sldChg chg="addSp delSp modSp add mod">
-        <pc:chgData name="elodiecslawinski@gmail.com" userId="2d9956b1ce3ed99c" providerId="LiveId" clId="{79719C05-BB10-4FCC-B2CE-0EC3DC887679}" dt="2021-09-25T13:43:42.702" v="199"/>
+        <pc:chgData name="elodiecslawinski@gmail.com" userId="2d9956b1ce3ed99c" providerId="LiveId" clId="{79719C05-BB10-4FCC-B2CE-0EC3DC887679}" dt="2021-09-25T15:09:57.158" v="838" actId="948"/>
+        <pc:sldMkLst>
+          <pc:docMk/>
+          <pc:sldMk cId="278083588" sldId="267"/>
+        </pc:sldMkLst>
+        <pc:spChg chg="add del mod">
+          <ac:chgData name="elodiecslawinski@gmail.com" userId="2d9956b1ce3ed99c" providerId="LiveId" clId="{79719C05-BB10-4FCC-B2CE-0EC3DC887679}" dt="2021-09-25T15:05:48.229" v="348" actId="478"/>
+          <ac:spMkLst>
+            <pc:docMk/>
+            <pc:sldMk cId="278083588" sldId="267"/>
+            <ac:spMk id="7" creationId="{FA95AC9F-749C-4495-93F1-BEFA77B11FE0}"/>
+          </ac:spMkLst>
+        </pc:spChg>
+        <pc:spChg chg="add del mod">
+          <ac:chgData name="elodiecslawinski@gmail.com" userId="2d9956b1ce3ed99c" providerId="LiveId" clId="{79719C05-BB10-4FCC-B2CE-0EC3DC887679}" dt="2021-09-25T15:05:48.229" v="348" actId="478"/>
+          <ac:spMkLst>
+            <pc:docMk/>
+            <pc:sldMk cId="278083588" sldId="267"/>
+            <ac:spMk id="9" creationId="{94965EF6-3755-44DB-BBCF-89A46FBB41BA}"/>
+          </ac:spMkLst>
+        </pc:spChg>
+        <pc:spChg chg="add del mod">
+          <ac:chgData name="elodiecslawinski@gmail.com" userId="2d9956b1ce3ed99c" providerId="LiveId" clId="{79719C05-BB10-4FCC-B2CE-0EC3DC887679}" dt="2021-09-25T15:05:48.229" v="348" actId="478"/>
+          <ac:spMkLst>
+            <pc:docMk/>
+            <pc:sldMk cId="278083588" sldId="267"/>
+            <ac:spMk id="11" creationId="{BF058A83-0E53-4EEF-A46C-1E0AD84B3EC7}"/>
+          </ac:spMkLst>
+        </pc:spChg>
+        <pc:spChg chg="add mod">
+          <ac:chgData name="elodiecslawinski@gmail.com" userId="2d9956b1ce3ed99c" providerId="LiveId" clId="{79719C05-BB10-4FCC-B2CE-0EC3DC887679}" dt="2021-09-25T15:06:06.385" v="385" actId="27636"/>
+          <ac:spMkLst>
+            <pc:docMk/>
+            <pc:sldMk cId="278083588" sldId="267"/>
+            <ac:spMk id="15" creationId="{D77A808B-59FF-4693-9381-96D6E713FB7D}"/>
+          </ac:spMkLst>
+        </pc:spChg>
+        <pc:spChg chg="add mod">
+          <ac:chgData name="elodiecslawinski@gmail.com" userId="2d9956b1ce3ed99c" providerId="LiveId" clId="{79719C05-BB10-4FCC-B2CE-0EC3DC887679}" dt="2021-09-25T15:09:57.158" v="838" actId="948"/>
+          <ac:spMkLst>
+            <pc:docMk/>
+            <pc:sldMk cId="278083588" sldId="267"/>
+            <ac:spMk id="16" creationId="{14C7CA51-417C-46E3-BA84-AA664C9C39A8}"/>
+          </ac:spMkLst>
+        </pc:spChg>
+        <pc:spChg chg="add mod">
+          <ac:chgData name="elodiecslawinski@gmail.com" userId="2d9956b1ce3ed99c" providerId="LiveId" clId="{79719C05-BB10-4FCC-B2CE-0EC3DC887679}" dt="2021-09-25T15:05:48.707" v="349"/>
+          <ac:spMkLst>
+            <pc:docMk/>
+            <pc:sldMk cId="278083588" sldId="267"/>
+            <ac:spMk id="17" creationId="{ADBDCC2D-1F92-4943-B2A1-CAF50E8D6117}"/>
+          </ac:spMkLst>
+        </pc:spChg>
+        <pc:spChg chg="del mod">
+          <ac:chgData name="elodiecslawinski@gmail.com" userId="2d9956b1ce3ed99c" providerId="LiveId" clId="{79719C05-BB10-4FCC-B2CE-0EC3DC887679}" dt="2021-09-25T15:05:45.409" v="346" actId="478"/>
+          <ac:spMkLst>
+            <pc:docMk/>
+            <pc:sldMk cId="278083588" sldId="267"/>
+            <ac:spMk id="464" creationId="{00000000-0000-0000-0000-000000000000}"/>
+          </ac:spMkLst>
+        </pc:spChg>
+        <pc:spChg chg="del">
+          <ac:chgData name="elodiecslawinski@gmail.com" userId="2d9956b1ce3ed99c" providerId="LiveId" clId="{79719C05-BB10-4FCC-B2CE-0EC3DC887679}" dt="2021-09-25T15:05:45.409" v="346" actId="478"/>
+          <ac:spMkLst>
+            <pc:docMk/>
+            <pc:sldMk cId="278083588" sldId="267"/>
+            <ac:spMk id="465" creationId="{00000000-0000-0000-0000-000000000000}"/>
+          </ac:spMkLst>
+        </pc:spChg>
+        <pc:spChg chg="del">
+          <ac:chgData name="elodiecslawinski@gmail.com" userId="2d9956b1ce3ed99c" providerId="LiveId" clId="{79719C05-BB10-4FCC-B2CE-0EC3DC887679}" dt="2021-09-25T15:05:45.409" v="346" actId="478"/>
+          <ac:spMkLst>
+            <pc:docMk/>
+            <pc:sldMk cId="278083588" sldId="267"/>
+            <ac:spMk id="466" creationId="{00000000-0000-0000-0000-000000000000}"/>
+          </ac:spMkLst>
+        </pc:spChg>
+        <pc:picChg chg="del">
+          <ac:chgData name="elodiecslawinski@gmail.com" userId="2d9956b1ce3ed99c" providerId="LiveId" clId="{79719C05-BB10-4FCC-B2CE-0EC3DC887679}" dt="2021-09-25T15:03:56.989" v="269" actId="478"/>
+          <ac:picMkLst>
+            <pc:docMk/>
+            <pc:sldMk cId="278083588" sldId="267"/>
+            <ac:picMk id="4" creationId="{B29FA1EC-E4F3-4546-B034-BC2CAFC5F270}"/>
+          </ac:picMkLst>
+        </pc:picChg>
+        <pc:picChg chg="add mod">
+          <ac:chgData name="elodiecslawinski@gmail.com" userId="2d9956b1ce3ed99c" providerId="LiveId" clId="{79719C05-BB10-4FCC-B2CE-0EC3DC887679}" dt="2021-09-25T15:08:27.738" v="662" actId="1036"/>
+          <ac:picMkLst>
+            <pc:docMk/>
+            <pc:sldMk cId="278083588" sldId="267"/>
+            <ac:picMk id="5" creationId="{EDD5971F-437C-4BBA-A3FB-87DBBD3E945D}"/>
+          </ac:picMkLst>
+        </pc:picChg>
+      </pc:sldChg>
+      <pc:sldChg chg="addSp delSp modSp add del mod">
+        <pc:chgData name="elodiecslawinski@gmail.com" userId="2d9956b1ce3ed99c" providerId="LiveId" clId="{79719C05-BB10-4FCC-B2CE-0EC3DC887679}" dt="2021-09-25T15:02:14.183" v="200" actId="47"/>
         <pc:sldMkLst>
           <pc:docMk/>
           <pc:sldMk cId="3819131231" sldId="267"/>
@@ -467,6 +604,52 @@
             <ac:picMk id="467" creationId="{00000000-0000-0000-0000-000000000000}"/>
           </ac:picMkLst>
         </pc:picChg>
+      </pc:sldChg>
+      <pc:sldChg chg="addSp delSp modSp add mod">
+        <pc:chgData name="elodiecslawinski@gmail.com" userId="2d9956b1ce3ed99c" providerId="LiveId" clId="{79719C05-BB10-4FCC-B2CE-0EC3DC887679}" dt="2021-09-25T15:10:10.762" v="840" actId="948"/>
+        <pc:sldMkLst>
+          <pc:docMk/>
+          <pc:sldMk cId="1111481105" sldId="268"/>
+        </pc:sldMkLst>
+        <pc:spChg chg="mod">
+          <ac:chgData name="elodiecslawinski@gmail.com" userId="2d9956b1ce3ed99c" providerId="LiveId" clId="{79719C05-BB10-4FCC-B2CE-0EC3DC887679}" dt="2021-09-25T15:07:48.453" v="643" actId="20577"/>
+          <ac:spMkLst>
+            <pc:docMk/>
+            <pc:sldMk cId="1111481105" sldId="268"/>
+            <ac:spMk id="15" creationId="{D77A808B-59FF-4693-9381-96D6E713FB7D}"/>
+          </ac:spMkLst>
+        </pc:spChg>
+        <pc:spChg chg="mod">
+          <ac:chgData name="elodiecslawinski@gmail.com" userId="2d9956b1ce3ed99c" providerId="LiveId" clId="{79719C05-BB10-4FCC-B2CE-0EC3DC887679}" dt="2021-09-25T15:10:10.762" v="840" actId="948"/>
+          <ac:spMkLst>
+            <pc:docMk/>
+            <pc:sldMk cId="1111481105" sldId="268"/>
+            <ac:spMk id="16" creationId="{14C7CA51-417C-46E3-BA84-AA664C9C39A8}"/>
+          </ac:spMkLst>
+        </pc:spChg>
+        <pc:picChg chg="add mod">
+          <ac:chgData name="elodiecslawinski@gmail.com" userId="2d9956b1ce3ed99c" providerId="LiveId" clId="{79719C05-BB10-4FCC-B2CE-0EC3DC887679}" dt="2021-09-25T15:08:32.510" v="670" actId="1036"/>
+          <ac:picMkLst>
+            <pc:docMk/>
+            <pc:sldMk cId="1111481105" sldId="268"/>
+            <ac:picMk id="4" creationId="{F1CB69F3-F12E-49EA-8E0A-E234207A4C94}"/>
+          </ac:picMkLst>
+        </pc:picChg>
+        <pc:picChg chg="del">
+          <ac:chgData name="elodiecslawinski@gmail.com" userId="2d9956b1ce3ed99c" providerId="LiveId" clId="{79719C05-BB10-4FCC-B2CE-0EC3DC887679}" dt="2021-09-25T15:07:27.798" v="597" actId="478"/>
+          <ac:picMkLst>
+            <pc:docMk/>
+            <pc:sldMk cId="1111481105" sldId="268"/>
+            <ac:picMk id="5" creationId="{EDD5971F-437C-4BBA-A3FB-87DBBD3E945D}"/>
+          </ac:picMkLst>
+        </pc:picChg>
+      </pc:sldChg>
+      <pc:sldChg chg="add">
+        <pc:chgData name="elodiecslawinski@gmail.com" userId="2d9956b1ce3ed99c" providerId="LiveId" clId="{79719C05-BB10-4FCC-B2CE-0EC3DC887679}" dt="2021-09-25T15:10:40.129" v="841" actId="2890"/>
+        <pc:sldMkLst>
+          <pc:docMk/>
+          <pc:sldMk cId="3714457294" sldId="269"/>
+        </pc:sldMkLst>
       </pc:sldChg>
     </pc:docChg>
   </pc:docChgLst>
@@ -1191,7 +1374,7 @@
     </p:spTree>
     <p:extLst>
       <p:ext uri="{BB962C8B-B14F-4D97-AF65-F5344CB8AC3E}">
-        <p14:creationId xmlns:p14="http://schemas.microsoft.com/office/powerpoint/2010/main" val="4187132817"/>
+        <p14:creationId xmlns:p14="http://schemas.microsoft.com/office/powerpoint/2010/main" val="2330284408"/>
       </p:ext>
     </p:extLst>
   </p:cSld>
@@ -1202,6 +1385,344 @@
 </file>
 
 <file path=ppt/notesSlides/notesSlide11.xml><?xml version="1.0" encoding="utf-8"?>
+<p:notes xmlns:a="http://schemas.openxmlformats.org/drawingml/2006/main" xmlns:r="http://schemas.openxmlformats.org/officeDocument/2006/relationships" xmlns:p="http://schemas.openxmlformats.org/presentationml/2006/main" showMasterSp="0" showMasterPhAnim="0">
+  <p:cSld>
+    <p:spTree>
+      <p:nvGrpSpPr>
+        <p:cNvPr id="1" name="Shape 459"/>
+        <p:cNvGrpSpPr/>
+        <p:nvPr/>
+      </p:nvGrpSpPr>
+      <p:grpSpPr>
+        <a:xfrm>
+          <a:off x="0" y="0"/>
+          <a:ext cx="0" cy="0"/>
+          <a:chOff x="0" y="0"/>
+          <a:chExt cx="0" cy="0"/>
+        </a:xfrm>
+      </p:grpSpPr>
+      <p:sp>
+        <p:nvSpPr>
+          <p:cNvPr id="460" name="Google Shape;460;gecfae9c4b6_1_38:notes"/>
+          <p:cNvSpPr>
+            <a:spLocks noGrp="1" noRot="1" noChangeAspect="1"/>
+          </p:cNvSpPr>
+          <p:nvPr>
+            <p:ph type="sldImg" idx="2"/>
+          </p:nvPr>
+        </p:nvSpPr>
+        <p:spPr>
+          <a:xfrm>
+            <a:off x="685800" y="1143000"/>
+            <a:ext cx="5486400" cy="3086100"/>
+          </a:xfrm>
+          <a:custGeom>
+            <a:avLst/>
+            <a:gdLst/>
+            <a:ahLst/>
+            <a:cxnLst/>
+            <a:rect l="l" t="t" r="r" b="b"/>
+            <a:pathLst>
+              <a:path w="120000" h="120000" extrusionOk="0">
+                <a:moveTo>
+                  <a:pt x="0" y="0"/>
+                </a:moveTo>
+                <a:lnTo>
+                  <a:pt x="120000" y="0"/>
+                </a:lnTo>
+                <a:lnTo>
+                  <a:pt x="120000" y="120000"/>
+                </a:lnTo>
+                <a:lnTo>
+                  <a:pt x="0" y="120000"/>
+                </a:lnTo>
+                <a:close/>
+              </a:path>
+            </a:pathLst>
+          </a:custGeom>
+          <a:noFill/>
+          <a:ln w="12700" cap="flat" cmpd="sng">
+            <a:solidFill>
+              <a:srgbClr val="000000"/>
+            </a:solidFill>
+            <a:prstDash val="solid"/>
+            <a:round/>
+            <a:headEnd type="none" w="sm" len="sm"/>
+            <a:tailEnd type="none" w="sm" len="sm"/>
+          </a:ln>
+        </p:spPr>
+      </p:sp>
+      <p:sp>
+        <p:nvSpPr>
+          <p:cNvPr id="461" name="Google Shape;461;gecfae9c4b6_1_38:notes"/>
+          <p:cNvSpPr txBox="1">
+            <a:spLocks noGrp="1"/>
+          </p:cNvSpPr>
+          <p:nvPr>
+            <p:ph type="body" idx="1"/>
+          </p:nvPr>
+        </p:nvSpPr>
+        <p:spPr>
+          <a:xfrm>
+            <a:off x="685800" y="4400550"/>
+            <a:ext cx="5486400" cy="3600450"/>
+          </a:xfrm>
+          <a:prstGeom prst="rect">
+            <a:avLst/>
+          </a:prstGeom>
+          <a:noFill/>
+          <a:ln>
+            <a:noFill/>
+          </a:ln>
+        </p:spPr>
+        <p:txBody>
+          <a:bodyPr spcFirstLastPara="1" wrap="square" lIns="91425" tIns="45700" rIns="91425" bIns="45700" anchor="t" anchorCtr="0">
+            <a:noAutofit/>
+          </a:bodyPr>
+          <a:lstStyle/>
+          <a:p>
+            <a:pPr marL="0" lvl="0" indent="0" algn="l" rtl="0">
+              <a:spcBef>
+                <a:spcPts val="0"/>
+              </a:spcBef>
+              <a:spcAft>
+                <a:spcPts val="0"/>
+              </a:spcAft>
+              <a:buNone/>
+            </a:pPr>
+            <a:endParaRPr/>
+          </a:p>
+        </p:txBody>
+      </p:sp>
+      <p:sp>
+        <p:nvSpPr>
+          <p:cNvPr id="462" name="Google Shape;462;gecfae9c4b6_1_38:notes"/>
+          <p:cNvSpPr txBox="1">
+            <a:spLocks noGrp="1"/>
+          </p:cNvSpPr>
+          <p:nvPr>
+            <p:ph type="sldNum" idx="12"/>
+          </p:nvPr>
+        </p:nvSpPr>
+        <p:spPr>
+          <a:xfrm>
+            <a:off x="3884613" y="8685213"/>
+            <a:ext cx="2971800" cy="458787"/>
+          </a:xfrm>
+          <a:prstGeom prst="rect">
+            <a:avLst/>
+          </a:prstGeom>
+          <a:noFill/>
+          <a:ln>
+            <a:noFill/>
+          </a:ln>
+        </p:spPr>
+        <p:txBody>
+          <a:bodyPr spcFirstLastPara="1" wrap="square" lIns="91425" tIns="45700" rIns="91425" bIns="45700" anchor="b" anchorCtr="0">
+            <a:noAutofit/>
+          </a:bodyPr>
+          <a:lstStyle/>
+          <a:p>
+            <a:pPr marL="0" lvl="0" indent="0" algn="r" rtl="0">
+              <a:spcBef>
+                <a:spcPts val="0"/>
+              </a:spcBef>
+              <a:spcAft>
+                <a:spcPts val="0"/>
+              </a:spcAft>
+              <a:buNone/>
+            </a:pPr>
+            <a:fld id="{00000000-1234-1234-1234-123412341234}" type="slidenum">
+              <a:rPr lang="en"/>
+              <a:t>11</a:t>
+            </a:fld>
+            <a:endParaRPr/>
+          </a:p>
+        </p:txBody>
+      </p:sp>
+    </p:spTree>
+    <p:extLst>
+      <p:ext uri="{BB962C8B-B14F-4D97-AF65-F5344CB8AC3E}">
+        <p14:creationId xmlns:p14="http://schemas.microsoft.com/office/powerpoint/2010/main" val="1769194320"/>
+      </p:ext>
+    </p:extLst>
+  </p:cSld>
+  <p:clrMapOvr>
+    <a:masterClrMapping/>
+  </p:clrMapOvr>
+</p:notes>
+</file>
+
+<file path=ppt/notesSlides/notesSlide12.xml><?xml version="1.0" encoding="utf-8"?>
+<p:notes xmlns:a="http://schemas.openxmlformats.org/drawingml/2006/main" xmlns:r="http://schemas.openxmlformats.org/officeDocument/2006/relationships" xmlns:p="http://schemas.openxmlformats.org/presentationml/2006/main" showMasterSp="0" showMasterPhAnim="0">
+  <p:cSld>
+    <p:spTree>
+      <p:nvGrpSpPr>
+        <p:cNvPr id="1" name="Shape 459"/>
+        <p:cNvGrpSpPr/>
+        <p:nvPr/>
+      </p:nvGrpSpPr>
+      <p:grpSpPr>
+        <a:xfrm>
+          <a:off x="0" y="0"/>
+          <a:ext cx="0" cy="0"/>
+          <a:chOff x="0" y="0"/>
+          <a:chExt cx="0" cy="0"/>
+        </a:xfrm>
+      </p:grpSpPr>
+      <p:sp>
+        <p:nvSpPr>
+          <p:cNvPr id="460" name="Google Shape;460;gecfae9c4b6_1_38:notes"/>
+          <p:cNvSpPr>
+            <a:spLocks noGrp="1" noRot="1" noChangeAspect="1"/>
+          </p:cNvSpPr>
+          <p:nvPr>
+            <p:ph type="sldImg" idx="2"/>
+          </p:nvPr>
+        </p:nvSpPr>
+        <p:spPr>
+          <a:xfrm>
+            <a:off x="685800" y="1143000"/>
+            <a:ext cx="5486400" cy="3086100"/>
+          </a:xfrm>
+          <a:custGeom>
+            <a:avLst/>
+            <a:gdLst/>
+            <a:ahLst/>
+            <a:cxnLst/>
+            <a:rect l="l" t="t" r="r" b="b"/>
+            <a:pathLst>
+              <a:path w="120000" h="120000" extrusionOk="0">
+                <a:moveTo>
+                  <a:pt x="0" y="0"/>
+                </a:moveTo>
+                <a:lnTo>
+                  <a:pt x="120000" y="0"/>
+                </a:lnTo>
+                <a:lnTo>
+                  <a:pt x="120000" y="120000"/>
+                </a:lnTo>
+                <a:lnTo>
+                  <a:pt x="0" y="120000"/>
+                </a:lnTo>
+                <a:close/>
+              </a:path>
+            </a:pathLst>
+          </a:custGeom>
+          <a:noFill/>
+          <a:ln w="12700" cap="flat" cmpd="sng">
+            <a:solidFill>
+              <a:srgbClr val="000000"/>
+            </a:solidFill>
+            <a:prstDash val="solid"/>
+            <a:round/>
+            <a:headEnd type="none" w="sm" len="sm"/>
+            <a:tailEnd type="none" w="sm" len="sm"/>
+          </a:ln>
+        </p:spPr>
+      </p:sp>
+      <p:sp>
+        <p:nvSpPr>
+          <p:cNvPr id="461" name="Google Shape;461;gecfae9c4b6_1_38:notes"/>
+          <p:cNvSpPr txBox="1">
+            <a:spLocks noGrp="1"/>
+          </p:cNvSpPr>
+          <p:nvPr>
+            <p:ph type="body" idx="1"/>
+          </p:nvPr>
+        </p:nvSpPr>
+        <p:spPr>
+          <a:xfrm>
+            <a:off x="685800" y="4400550"/>
+            <a:ext cx="5486400" cy="3600450"/>
+          </a:xfrm>
+          <a:prstGeom prst="rect">
+            <a:avLst/>
+          </a:prstGeom>
+          <a:noFill/>
+          <a:ln>
+            <a:noFill/>
+          </a:ln>
+        </p:spPr>
+        <p:txBody>
+          <a:bodyPr spcFirstLastPara="1" wrap="square" lIns="91425" tIns="45700" rIns="91425" bIns="45700" anchor="t" anchorCtr="0">
+            <a:noAutofit/>
+          </a:bodyPr>
+          <a:lstStyle/>
+          <a:p>
+            <a:pPr marL="0" lvl="0" indent="0" algn="l" rtl="0">
+              <a:spcBef>
+                <a:spcPts val="0"/>
+              </a:spcBef>
+              <a:spcAft>
+                <a:spcPts val="0"/>
+              </a:spcAft>
+              <a:buNone/>
+            </a:pPr>
+            <a:endParaRPr/>
+          </a:p>
+        </p:txBody>
+      </p:sp>
+      <p:sp>
+        <p:nvSpPr>
+          <p:cNvPr id="462" name="Google Shape;462;gecfae9c4b6_1_38:notes"/>
+          <p:cNvSpPr txBox="1">
+            <a:spLocks noGrp="1"/>
+          </p:cNvSpPr>
+          <p:nvPr>
+            <p:ph type="sldNum" idx="12"/>
+          </p:nvPr>
+        </p:nvSpPr>
+        <p:spPr>
+          <a:xfrm>
+            <a:off x="3884613" y="8685213"/>
+            <a:ext cx="2971800" cy="458787"/>
+          </a:xfrm>
+          <a:prstGeom prst="rect">
+            <a:avLst/>
+          </a:prstGeom>
+          <a:noFill/>
+          <a:ln>
+            <a:noFill/>
+          </a:ln>
+        </p:spPr>
+        <p:txBody>
+          <a:bodyPr spcFirstLastPara="1" wrap="square" lIns="91425" tIns="45700" rIns="91425" bIns="45700" anchor="b" anchorCtr="0">
+            <a:noAutofit/>
+          </a:bodyPr>
+          <a:lstStyle/>
+          <a:p>
+            <a:pPr marL="0" lvl="0" indent="0" algn="r" rtl="0">
+              <a:spcBef>
+                <a:spcPts val="0"/>
+              </a:spcBef>
+              <a:spcAft>
+                <a:spcPts val="0"/>
+              </a:spcAft>
+              <a:buNone/>
+            </a:pPr>
+            <a:fld id="{00000000-1234-1234-1234-123412341234}" type="slidenum">
+              <a:rPr lang="en"/>
+              <a:t>12</a:t>
+            </a:fld>
+            <a:endParaRPr/>
+          </a:p>
+        </p:txBody>
+      </p:sp>
+    </p:spTree>
+    <p:extLst>
+      <p:ext uri="{BB962C8B-B14F-4D97-AF65-F5344CB8AC3E}">
+        <p14:creationId xmlns:p14="http://schemas.microsoft.com/office/powerpoint/2010/main" val="3524844530"/>
+      </p:ext>
+    </p:extLst>
+  </p:cSld>
+  <p:clrMapOvr>
+    <a:masterClrMapping/>
+  </p:clrMapOvr>
+</p:notes>
+</file>
+
+<file path=ppt/notesSlides/notesSlide13.xml><?xml version="1.0" encoding="utf-8"?>
 <p:notes xmlns:a="http://schemas.openxmlformats.org/drawingml/2006/main" xmlns:r="http://schemas.openxmlformats.org/officeDocument/2006/relationships" xmlns:p="http://schemas.openxmlformats.org/presentationml/2006/main" showMasterSp="0" showMasterPhAnim="0">
   <p:cSld>
     <p:spTree>
@@ -1309,13 +1830,9 @@
             </a:pPr>
             <a:r>
               <a:rPr lang="en-US" dirty="0"/>
-              <a:t>Need to complete the </a:t>
+              <a:t>Need to complete the second sentence</a:t>
             </a:r>
-            <a:r>
-              <a:rPr lang="en-US"/>
-              <a:t>second sentence</a:t>
-            </a:r>
-            <a:endParaRPr/>
+            <a:endParaRPr dirty="0"/>
           </a:p>
         </p:txBody>
       </p:sp>
@@ -1359,7 +1876,7 @@
             </a:pPr>
             <a:fld id="{00000000-1234-1234-1234-123412341234}" type="slidenum">
               <a:rPr lang="en"/>
-              <a:t>11</a:t>
+              <a:t>13</a:t>
             </a:fld>
             <a:endParaRPr/>
           </a:p>
@@ -1373,7 +1890,7 @@
 </p:notes>
 </file>
 
-<file path=ppt/notesSlides/notesSlide12.xml><?xml version="1.0" encoding="utf-8"?>
+<file path=ppt/notesSlides/notesSlide14.xml><?xml version="1.0" encoding="utf-8"?>
 <p:notes xmlns:a="http://schemas.openxmlformats.org/drawingml/2006/main" xmlns:r="http://schemas.openxmlformats.org/officeDocument/2006/relationships" xmlns:p="http://schemas.openxmlformats.org/presentationml/2006/main" showMasterSp="0" showMasterPhAnim="0">
   <p:cSld>
     <p:spTree>
@@ -1523,7 +2040,7 @@
             </a:pPr>
             <a:fld id="{00000000-1234-1234-1234-123412341234}" type="slidenum">
               <a:rPr lang="en"/>
-              <a:t>12</a:t>
+              <a:t>14</a:t>
             </a:fld>
             <a:endParaRPr/>
           </a:p>
@@ -44313,7 +44830,7 @@
         </p:nvSpPr>
         <p:spPr>
           <a:xfrm>
-            <a:off x="4972049" y="630000"/>
+            <a:off x="5214162" y="630000"/>
             <a:ext cx="3924000" cy="1006500"/>
           </a:xfrm>
           <a:prstGeom prst="rect">
@@ -44357,7 +44874,7 @@
                 <a:cs typeface="Arial"/>
                 <a:sym typeface="Arial"/>
               </a:rPr>
-              <a:t>Historical AQI By State v2</a:t>
+              <a:t>Historical AQI By State</a:t>
             </a:r>
             <a:endParaRPr dirty="0"/>
           </a:p>
@@ -44375,8 +44892,8 @@
         </p:nvSpPr>
         <p:spPr>
           <a:xfrm>
-            <a:off x="5093074" y="1976424"/>
-            <a:ext cx="3822300" cy="3065400"/>
+            <a:off x="5506280" y="1976424"/>
+            <a:ext cx="3339764" cy="3065400"/>
           </a:xfrm>
           <a:prstGeom prst="rect">
             <a:avLst/>
@@ -44397,7 +44914,7 @@
                 <a:spcPct val="100000"/>
               </a:lnSpc>
               <a:spcBef>
-                <a:spcPts val="0"/>
+                <a:spcPts val="600"/>
               </a:spcBef>
               <a:spcAft>
                 <a:spcPts val="0"/>
@@ -44409,10 +44926,10 @@
               <a:buNone/>
             </a:pPr>
             <a:r>
-              <a:rPr lang="en-US" sz="1560" dirty="0"/>
-              <a:t>ADD</a:t>
+              <a:rPr lang="en" sz="1400" dirty="0"/>
+              <a:t>This visualization summarizes the Air Quality Index (AQI) score by month and by state since November 2020.</a:t>
             </a:r>
-            <a:endParaRPr sz="1100" dirty="0"/>
+            <a:endParaRPr sz="1400" dirty="0"/>
           </a:p>
           <a:p>
             <a:pPr marL="0" lvl="0" indent="0" algn="l" rtl="0">
@@ -44420,7 +44937,7 @@
                 <a:spcPct val="100000"/>
               </a:lnSpc>
               <a:spcBef>
-                <a:spcPts val="800"/>
+                <a:spcPts val="600"/>
               </a:spcBef>
               <a:spcAft>
                 <a:spcPts val="0"/>
@@ -44431,7 +44948,11 @@
               <a:buSzPts val="1100"/>
               <a:buNone/>
             </a:pPr>
-            <a:endParaRPr sz="1100" dirty="0"/>
+            <a:r>
+              <a:rPr lang="en" sz="1400" dirty="0"/>
+              <a:t>Average AQIs have been steady between November 2020 and July 2021, with a significant increase in August 2021, particularly in California (that is likely due to the fire activity across the state in the summer of 2021).</a:t>
+            </a:r>
+            <a:endParaRPr sz="1400" dirty="0"/>
           </a:p>
         </p:txBody>
       </p:sp>
@@ -44447,7 +44968,7 @@
         </p:nvSpPr>
         <p:spPr>
           <a:xfrm>
-            <a:off x="5093085" y="1685759"/>
+            <a:off x="5388439" y="1691381"/>
             <a:ext cx="3575447" cy="241426"/>
           </a:xfrm>
           <a:prstGeom prst="rect">
@@ -44488,70 +45009,75 @@
           </a:p>
         </p:txBody>
       </p:sp>
-      <mc:AlternateContent xmlns:mc="http://schemas.openxmlformats.org/markup-compatibility/2006">
-        <mc:Choice xmlns:we="http://schemas.microsoft.com/office/webextensions/webextension/2010/11" xmlns:pca="http://schemas.microsoft.com/office/powerpoint/2013/contentapp" Requires="we pca">
-          <p:graphicFrame>
-            <p:nvGraphicFramePr>
-              <p:cNvPr id="2" name="Add-in 1" title="Web Viewer">
-                <a:extLst>
-                  <a:ext uri="{FF2B5EF4-FFF2-40B4-BE49-F238E27FC236}">
-                    <a16:creationId xmlns:a16="http://schemas.microsoft.com/office/drawing/2014/main" id="{A7D013E8-D6DF-4000-8459-2716855D622C}"/>
-                  </a:ext>
-                </a:extLst>
-              </p:cNvPr>
-              <p:cNvGraphicFramePr>
-                <a:graphicFrameLocks noGrp="1"/>
-              </p:cNvGraphicFramePr>
-              <p:nvPr/>
-            </p:nvGraphicFramePr>
-            <p:xfrm>
-              <a:off x="0" y="0"/>
-              <a:ext cx="9144000" cy="5143500"/>
-            </p:xfrm>
-            <a:graphic>
-              <a:graphicData uri="http://schemas.microsoft.com/office/webextensions/webextension/2010/11">
-                <we:webextensionref xmlns:we="http://schemas.microsoft.com/office/webextensions/webextension/2010/11" xmlns:r="http://schemas.openxmlformats.org/officeDocument/2006/relationships" r:id="rId3"/>
-              </a:graphicData>
-            </a:graphic>
-          </p:graphicFrame>
-        </mc:Choice>
-        <mc:Fallback>
-          <p:pic>
-            <p:nvPicPr>
-              <p:cNvPr id="2" name="Add-in 1" title="Web Viewer">
-                <a:extLst>
-                  <a:ext uri="{FF2B5EF4-FFF2-40B4-BE49-F238E27FC236}">
-                    <a16:creationId xmlns:a16="http://schemas.microsoft.com/office/drawing/2014/main" id="{A7D013E8-D6DF-4000-8459-2716855D622C}"/>
-                  </a:ext>
-                </a:extLst>
-              </p:cNvPr>
-              <p:cNvPicPr>
-                <a:picLocks noGrp="1" noRot="1" noChangeAspect="1" noMove="1" noResize="1" noEditPoints="1" noAdjustHandles="1" noChangeArrowheads="1" noChangeShapeType="1"/>
-              </p:cNvPicPr>
-              <p:nvPr/>
-            </p:nvPicPr>
-            <p:blipFill>
-              <a:blip r:embed="rId4"/>
-              <a:stretch>
-                <a:fillRect/>
-              </a:stretch>
-            </p:blipFill>
-            <p:spPr>
-              <a:xfrm>
-                <a:off x="0" y="0"/>
-                <a:ext cx="9144000" cy="5143500"/>
-              </a:xfrm>
-              <a:prstGeom prst="rect">
-                <a:avLst/>
-              </a:prstGeom>
-            </p:spPr>
-          </p:pic>
-        </mc:Fallback>
-      </mc:AlternateContent>
+      <p:sp>
+        <p:nvSpPr>
+          <p:cNvPr id="2" name="TextBox 1">
+            <a:extLst>
+              <a:ext uri="{FF2B5EF4-FFF2-40B4-BE49-F238E27FC236}">
+                <a16:creationId xmlns:a16="http://schemas.microsoft.com/office/drawing/2014/main" id="{652A84E4-554A-4088-BEE6-1A777E8D4EA5}"/>
+              </a:ext>
+            </a:extLst>
+          </p:cNvPr>
+          <p:cNvSpPr txBox="1"/>
+          <p:nvPr/>
+        </p:nvSpPr>
+        <p:spPr>
+          <a:xfrm>
+            <a:off x="532737" y="4767041"/>
+            <a:ext cx="8094428" cy="261610"/>
+          </a:xfrm>
+          <a:prstGeom prst="rect">
+            <a:avLst/>
+          </a:prstGeom>
+          <a:noFill/>
+        </p:spPr>
+        <p:txBody>
+          <a:bodyPr wrap="square" rtlCol="0">
+            <a:spAutoFit/>
+          </a:bodyPr>
+          <a:lstStyle/>
+          <a:p>
+            <a:r>
+              <a:rPr lang="en-US" sz="1100" i="1" dirty="0"/>
+              <a:t>Tableau Story Link: https://public.tableau.com/app/profile/elo.sla/viz/Final_Project_AQI_Story/AQIStory?publish=yes</a:t>
+            </a:r>
+          </a:p>
+        </p:txBody>
+      </p:sp>
+      <p:pic>
+        <p:nvPicPr>
+          <p:cNvPr id="4" name="Picture 3">
+            <a:extLst>
+              <a:ext uri="{FF2B5EF4-FFF2-40B4-BE49-F238E27FC236}">
+                <a16:creationId xmlns:a16="http://schemas.microsoft.com/office/drawing/2014/main" id="{B29FA1EC-E4F3-4546-B034-BC2CAFC5F270}"/>
+              </a:ext>
+            </a:extLst>
+          </p:cNvPr>
+          <p:cNvPicPr>
+            <a:picLocks noChangeAspect="1"/>
+          </p:cNvPicPr>
+          <p:nvPr/>
+        </p:nvPicPr>
+        <p:blipFill>
+          <a:blip r:embed="rId3"/>
+          <a:stretch>
+            <a:fillRect/>
+          </a:stretch>
+        </p:blipFill>
+        <p:spPr>
+          <a:xfrm>
+            <a:off x="5904" y="1665387"/>
+            <a:ext cx="5342689" cy="2728333"/>
+          </a:xfrm>
+          <a:prstGeom prst="rect">
+            <a:avLst/>
+          </a:prstGeom>
+        </p:spPr>
+      </p:pic>
     </p:spTree>
     <p:extLst>
       <p:ext uri="{BB962C8B-B14F-4D97-AF65-F5344CB8AC3E}">
-        <p14:creationId xmlns:p14="http://schemas.microsoft.com/office/powerpoint/2010/main" val="3819131231"/>
+        <p14:creationId xmlns:p14="http://schemas.microsoft.com/office/powerpoint/2010/main" val="3714457294"/>
       </p:ext>
     </p:extLst>
   </p:cSld>
@@ -44562,6 +45088,631 @@
 </file>
 
 <file path=ppt/slides/slide11.xml><?xml version="1.0" encoding="utf-8"?>
+<p:sld xmlns:a="http://schemas.openxmlformats.org/drawingml/2006/main" xmlns:r="http://schemas.openxmlformats.org/officeDocument/2006/relationships" xmlns:p="http://schemas.openxmlformats.org/presentationml/2006/main">
+  <p:cSld>
+    <p:spTree>
+      <p:nvGrpSpPr>
+        <p:cNvPr id="1" name="Shape 463"/>
+        <p:cNvGrpSpPr/>
+        <p:nvPr/>
+      </p:nvGrpSpPr>
+      <p:grpSpPr>
+        <a:xfrm>
+          <a:off x="0" y="0"/>
+          <a:ext cx="0" cy="0"/>
+          <a:chOff x="0" y="0"/>
+          <a:chExt cx="0" cy="0"/>
+        </a:xfrm>
+      </p:grpSpPr>
+      <p:sp>
+        <p:nvSpPr>
+          <p:cNvPr id="2" name="TextBox 1">
+            <a:extLst>
+              <a:ext uri="{FF2B5EF4-FFF2-40B4-BE49-F238E27FC236}">
+                <a16:creationId xmlns:a16="http://schemas.microsoft.com/office/drawing/2014/main" id="{652A84E4-554A-4088-BEE6-1A777E8D4EA5}"/>
+              </a:ext>
+            </a:extLst>
+          </p:cNvPr>
+          <p:cNvSpPr txBox="1"/>
+          <p:nvPr/>
+        </p:nvSpPr>
+        <p:spPr>
+          <a:xfrm>
+            <a:off x="532737" y="4767041"/>
+            <a:ext cx="8094428" cy="261610"/>
+          </a:xfrm>
+          <a:prstGeom prst="rect">
+            <a:avLst/>
+          </a:prstGeom>
+          <a:noFill/>
+        </p:spPr>
+        <p:txBody>
+          <a:bodyPr wrap="square" rtlCol="0">
+            <a:spAutoFit/>
+          </a:bodyPr>
+          <a:lstStyle/>
+          <a:p>
+            <a:r>
+              <a:rPr lang="en-US" sz="1100" i="1" dirty="0"/>
+              <a:t>Tableau Story Link: https://public.tableau.com/app/profile/elo.sla/viz/Final_Project_AQI_Story/AQIStory?publish=yes</a:t>
+            </a:r>
+          </a:p>
+        </p:txBody>
+      </p:sp>
+      <p:pic>
+        <p:nvPicPr>
+          <p:cNvPr id="5" name="Picture 4">
+            <a:extLst>
+              <a:ext uri="{FF2B5EF4-FFF2-40B4-BE49-F238E27FC236}">
+                <a16:creationId xmlns:a16="http://schemas.microsoft.com/office/drawing/2014/main" id="{EDD5971F-437C-4BBA-A3FB-87DBBD3E945D}"/>
+              </a:ext>
+            </a:extLst>
+          </p:cNvPr>
+          <p:cNvPicPr>
+            <a:picLocks noChangeAspect="1"/>
+          </p:cNvPicPr>
+          <p:nvPr/>
+        </p:nvPicPr>
+        <p:blipFill>
+          <a:blip r:embed="rId3"/>
+          <a:stretch>
+            <a:fillRect/>
+          </a:stretch>
+        </p:blipFill>
+        <p:spPr>
+          <a:xfrm>
+            <a:off x="0" y="1665897"/>
+            <a:ext cx="5340096" cy="2781882"/>
+          </a:xfrm>
+          <a:prstGeom prst="rect">
+            <a:avLst/>
+          </a:prstGeom>
+        </p:spPr>
+      </p:pic>
+      <p:sp>
+        <p:nvSpPr>
+          <p:cNvPr id="15" name="Google Shape;464;p74">
+            <a:extLst>
+              <a:ext uri="{FF2B5EF4-FFF2-40B4-BE49-F238E27FC236}">
+                <a16:creationId xmlns:a16="http://schemas.microsoft.com/office/drawing/2014/main" id="{D77A808B-59FF-4693-9381-96D6E713FB7D}"/>
+              </a:ext>
+            </a:extLst>
+          </p:cNvPr>
+          <p:cNvSpPr txBox="1">
+            <a:spLocks noGrp="1"/>
+          </p:cNvSpPr>
+          <p:nvPr>
+            <p:ph type="title"/>
+          </p:nvPr>
+        </p:nvSpPr>
+        <p:spPr>
+          <a:xfrm>
+            <a:off x="5214162" y="630000"/>
+            <a:ext cx="3924000" cy="1006500"/>
+          </a:xfrm>
+          <a:prstGeom prst="rect">
+            <a:avLst/>
+          </a:prstGeom>
+          <a:noFill/>
+          <a:ln>
+            <a:noFill/>
+          </a:ln>
+        </p:spPr>
+        <p:txBody>
+          <a:bodyPr spcFirstLastPara="1" wrap="square" lIns="0" tIns="34275" rIns="68575" bIns="34275" anchor="b" anchorCtr="0">
+            <a:normAutofit/>
+          </a:bodyPr>
+          <a:lstStyle/>
+          <a:p>
+            <a:pPr marL="0" lvl="0" indent="0" algn="ctr" rtl="0">
+              <a:lnSpc>
+                <a:spcPct val="90000"/>
+              </a:lnSpc>
+              <a:spcBef>
+                <a:spcPts val="0"/>
+              </a:spcBef>
+              <a:spcAft>
+                <a:spcPts val="0"/>
+              </a:spcAft>
+              <a:buClr>
+                <a:srgbClr val="5DAAB0"/>
+              </a:buClr>
+              <a:buSzPts val="3300"/>
+              <a:buFont typeface="Arial"/>
+              <a:buNone/>
+            </a:pPr>
+            <a:r>
+              <a:rPr lang="en" dirty="0">
+                <a:solidFill>
+                  <a:srgbClr val="5DAAB0"/>
+                </a:solidFill>
+                <a:latin typeface="Arial"/>
+                <a:ea typeface="Arial"/>
+                <a:cs typeface="Arial"/>
+                <a:sym typeface="Arial"/>
+              </a:rPr>
+              <a:t>Historical Pollutants by Month in DC</a:t>
+            </a:r>
+            <a:endParaRPr dirty="0"/>
+          </a:p>
+        </p:txBody>
+      </p:sp>
+      <p:sp>
+        <p:nvSpPr>
+          <p:cNvPr id="16" name="Google Shape;465;p74">
+            <a:extLst>
+              <a:ext uri="{FF2B5EF4-FFF2-40B4-BE49-F238E27FC236}">
+                <a16:creationId xmlns:a16="http://schemas.microsoft.com/office/drawing/2014/main" id="{14C7CA51-417C-46E3-BA84-AA664C9C39A8}"/>
+              </a:ext>
+            </a:extLst>
+          </p:cNvPr>
+          <p:cNvSpPr txBox="1">
+            <a:spLocks noGrp="1"/>
+          </p:cNvSpPr>
+          <p:nvPr>
+            <p:ph type="body" idx="1"/>
+          </p:nvPr>
+        </p:nvSpPr>
+        <p:spPr>
+          <a:xfrm>
+            <a:off x="5506280" y="1976424"/>
+            <a:ext cx="3339764" cy="3065400"/>
+          </a:xfrm>
+          <a:prstGeom prst="rect">
+            <a:avLst/>
+          </a:prstGeom>
+          <a:noFill/>
+          <a:ln>
+            <a:noFill/>
+          </a:ln>
+        </p:spPr>
+        <p:txBody>
+          <a:bodyPr spcFirstLastPara="1" wrap="square" lIns="0" tIns="34275" rIns="68575" bIns="34275" anchor="t" anchorCtr="0">
+            <a:normAutofit/>
+          </a:bodyPr>
+          <a:lstStyle/>
+          <a:p>
+            <a:pPr marL="0" lvl="0" indent="0" algn="l" rtl="0">
+              <a:lnSpc>
+                <a:spcPct val="100000"/>
+              </a:lnSpc>
+              <a:spcBef>
+                <a:spcPts val="600"/>
+              </a:spcBef>
+              <a:spcAft>
+                <a:spcPts val="0"/>
+              </a:spcAft>
+              <a:buClr>
+                <a:schemeClr val="dk2"/>
+              </a:buClr>
+              <a:buSzPts val="1100"/>
+              <a:buNone/>
+            </a:pPr>
+            <a:r>
+              <a:rPr lang="en" sz="1400" dirty="0"/>
+              <a:t>This visualization summarizes the 8 pollutants tracked by OpenWeatherin Washington, DC since November 2020.</a:t>
+            </a:r>
+            <a:endParaRPr sz="1400" dirty="0"/>
+          </a:p>
+          <a:p>
+            <a:pPr marL="0" lvl="0" indent="0" algn="l" rtl="0">
+              <a:lnSpc>
+                <a:spcPct val="100000"/>
+              </a:lnSpc>
+              <a:spcBef>
+                <a:spcPts val="600"/>
+              </a:spcBef>
+              <a:spcAft>
+                <a:spcPts val="0"/>
+              </a:spcAft>
+              <a:buClr>
+                <a:schemeClr val="dk2"/>
+              </a:buClr>
+              <a:buSzPts val="1100"/>
+              <a:buNone/>
+            </a:pPr>
+            <a:r>
+              <a:rPr lang="en-US" sz="1400" dirty="0"/>
+              <a:t>While the scales of each pollutant vary, this visualization helps understand how each pollutant increase or decrease over time.</a:t>
+            </a:r>
+            <a:endParaRPr sz="1400" dirty="0"/>
+          </a:p>
+          <a:p>
+            <a:pPr marL="0" lvl="0" indent="0" algn="l" rtl="0">
+              <a:lnSpc>
+                <a:spcPct val="100000"/>
+              </a:lnSpc>
+              <a:spcBef>
+                <a:spcPts val="600"/>
+              </a:spcBef>
+              <a:spcAft>
+                <a:spcPts val="0"/>
+              </a:spcAft>
+              <a:buClr>
+                <a:schemeClr val="dk2"/>
+              </a:buClr>
+              <a:buSzPts val="1100"/>
+              <a:buNone/>
+            </a:pPr>
+            <a:endParaRPr sz="1400" dirty="0"/>
+          </a:p>
+        </p:txBody>
+      </p:sp>
+      <p:sp>
+        <p:nvSpPr>
+          <p:cNvPr id="17" name="Google Shape;466;p74">
+            <a:extLst>
+              <a:ext uri="{FF2B5EF4-FFF2-40B4-BE49-F238E27FC236}">
+                <a16:creationId xmlns:a16="http://schemas.microsoft.com/office/drawing/2014/main" id="{ADBDCC2D-1F92-4943-B2A1-CAF50E8D6117}"/>
+              </a:ext>
+            </a:extLst>
+          </p:cNvPr>
+          <p:cNvSpPr txBox="1">
+            <a:spLocks noGrp="1"/>
+          </p:cNvSpPr>
+          <p:nvPr>
+            <p:ph type="body" idx="2"/>
+          </p:nvPr>
+        </p:nvSpPr>
+        <p:spPr>
+          <a:xfrm>
+            <a:off x="5388439" y="1691381"/>
+            <a:ext cx="3575447" cy="241426"/>
+          </a:xfrm>
+          <a:prstGeom prst="rect">
+            <a:avLst/>
+          </a:prstGeom>
+          <a:noFill/>
+          <a:ln>
+            <a:noFill/>
+          </a:ln>
+        </p:spPr>
+        <p:txBody>
+          <a:bodyPr spcFirstLastPara="1" wrap="square" lIns="0" tIns="34275" rIns="68575" bIns="34275" anchor="t" anchorCtr="0">
+            <a:normAutofit/>
+          </a:bodyPr>
+          <a:lstStyle/>
+          <a:p>
+            <a:pPr marL="0" lvl="0" indent="0" algn="ctr" rtl="0">
+              <a:lnSpc>
+                <a:spcPct val="90000"/>
+              </a:lnSpc>
+              <a:spcBef>
+                <a:spcPts val="0"/>
+              </a:spcBef>
+              <a:spcAft>
+                <a:spcPts val="0"/>
+              </a:spcAft>
+              <a:buClr>
+                <a:schemeClr val="dk2"/>
+              </a:buClr>
+              <a:buSzPts val="1100"/>
+              <a:buNone/>
+            </a:pPr>
+            <a:r>
+              <a:rPr lang="en" sz="1100" dirty="0"/>
+              <a:t>USING TABLEAU</a:t>
+            </a:r>
+            <a:endParaRPr sz="1100" dirty="0"/>
+          </a:p>
+        </p:txBody>
+      </p:sp>
+    </p:spTree>
+    <p:extLst>
+      <p:ext uri="{BB962C8B-B14F-4D97-AF65-F5344CB8AC3E}">
+        <p14:creationId xmlns:p14="http://schemas.microsoft.com/office/powerpoint/2010/main" val="278083588"/>
+      </p:ext>
+    </p:extLst>
+  </p:cSld>
+  <p:clrMapOvr>
+    <a:masterClrMapping/>
+  </p:clrMapOvr>
+</p:sld>
+</file>
+
+<file path=ppt/slides/slide12.xml><?xml version="1.0" encoding="utf-8"?>
+<p:sld xmlns:a="http://schemas.openxmlformats.org/drawingml/2006/main" xmlns:r="http://schemas.openxmlformats.org/officeDocument/2006/relationships" xmlns:p="http://schemas.openxmlformats.org/presentationml/2006/main">
+  <p:cSld>
+    <p:spTree>
+      <p:nvGrpSpPr>
+        <p:cNvPr id="1" name="Shape 463"/>
+        <p:cNvGrpSpPr/>
+        <p:nvPr/>
+      </p:nvGrpSpPr>
+      <p:grpSpPr>
+        <a:xfrm>
+          <a:off x="0" y="0"/>
+          <a:ext cx="0" cy="0"/>
+          <a:chOff x="0" y="0"/>
+          <a:chExt cx="0" cy="0"/>
+        </a:xfrm>
+      </p:grpSpPr>
+      <p:sp>
+        <p:nvSpPr>
+          <p:cNvPr id="2" name="TextBox 1">
+            <a:extLst>
+              <a:ext uri="{FF2B5EF4-FFF2-40B4-BE49-F238E27FC236}">
+                <a16:creationId xmlns:a16="http://schemas.microsoft.com/office/drawing/2014/main" id="{652A84E4-554A-4088-BEE6-1A777E8D4EA5}"/>
+              </a:ext>
+            </a:extLst>
+          </p:cNvPr>
+          <p:cNvSpPr txBox="1"/>
+          <p:nvPr/>
+        </p:nvSpPr>
+        <p:spPr>
+          <a:xfrm>
+            <a:off x="532737" y="4767041"/>
+            <a:ext cx="8094428" cy="261610"/>
+          </a:xfrm>
+          <a:prstGeom prst="rect">
+            <a:avLst/>
+          </a:prstGeom>
+          <a:noFill/>
+        </p:spPr>
+        <p:txBody>
+          <a:bodyPr wrap="square" rtlCol="0">
+            <a:spAutoFit/>
+          </a:bodyPr>
+          <a:lstStyle/>
+          <a:p>
+            <a:r>
+              <a:rPr lang="en-US" sz="1100" i="1" dirty="0"/>
+              <a:t>Tableau Story Link: https://public.tableau.com/app/profile/elo.sla/viz/Final_Project_AQI_Story/AQIStory?publish=yes</a:t>
+            </a:r>
+          </a:p>
+        </p:txBody>
+      </p:sp>
+      <p:sp>
+        <p:nvSpPr>
+          <p:cNvPr id="15" name="Google Shape;464;p74">
+            <a:extLst>
+              <a:ext uri="{FF2B5EF4-FFF2-40B4-BE49-F238E27FC236}">
+                <a16:creationId xmlns:a16="http://schemas.microsoft.com/office/drawing/2014/main" id="{D77A808B-59FF-4693-9381-96D6E713FB7D}"/>
+              </a:ext>
+            </a:extLst>
+          </p:cNvPr>
+          <p:cNvSpPr txBox="1">
+            <a:spLocks noGrp="1"/>
+          </p:cNvSpPr>
+          <p:nvPr>
+            <p:ph type="title"/>
+          </p:nvPr>
+        </p:nvSpPr>
+        <p:spPr>
+          <a:xfrm>
+            <a:off x="5214162" y="630000"/>
+            <a:ext cx="3924000" cy="1006500"/>
+          </a:xfrm>
+          <a:prstGeom prst="rect">
+            <a:avLst/>
+          </a:prstGeom>
+          <a:noFill/>
+          <a:ln>
+            <a:noFill/>
+          </a:ln>
+        </p:spPr>
+        <p:txBody>
+          <a:bodyPr spcFirstLastPara="1" wrap="square" lIns="0" tIns="34275" rIns="68575" bIns="34275" anchor="b" anchorCtr="0">
+            <a:normAutofit/>
+          </a:bodyPr>
+          <a:lstStyle/>
+          <a:p>
+            <a:pPr marL="0" lvl="0" indent="0" algn="ctr" rtl="0">
+              <a:lnSpc>
+                <a:spcPct val="90000"/>
+              </a:lnSpc>
+              <a:spcBef>
+                <a:spcPts val="0"/>
+              </a:spcBef>
+              <a:spcAft>
+                <a:spcPts val="0"/>
+              </a:spcAft>
+              <a:buClr>
+                <a:srgbClr val="5DAAB0"/>
+              </a:buClr>
+              <a:buSzPts val="3300"/>
+              <a:buFont typeface="Arial"/>
+              <a:buNone/>
+            </a:pPr>
+            <a:r>
+              <a:rPr lang="en" dirty="0">
+                <a:solidFill>
+                  <a:srgbClr val="5DAAB0"/>
+                </a:solidFill>
+                <a:latin typeface="Arial"/>
+                <a:ea typeface="Arial"/>
+                <a:cs typeface="Arial"/>
+                <a:sym typeface="Arial"/>
+              </a:rPr>
+              <a:t>Historical Ozone (O3) Levels by State</a:t>
+            </a:r>
+            <a:endParaRPr dirty="0"/>
+          </a:p>
+        </p:txBody>
+      </p:sp>
+      <p:sp>
+        <p:nvSpPr>
+          <p:cNvPr id="16" name="Google Shape;465;p74">
+            <a:extLst>
+              <a:ext uri="{FF2B5EF4-FFF2-40B4-BE49-F238E27FC236}">
+                <a16:creationId xmlns:a16="http://schemas.microsoft.com/office/drawing/2014/main" id="{14C7CA51-417C-46E3-BA84-AA664C9C39A8}"/>
+              </a:ext>
+            </a:extLst>
+          </p:cNvPr>
+          <p:cNvSpPr txBox="1">
+            <a:spLocks noGrp="1"/>
+          </p:cNvSpPr>
+          <p:nvPr>
+            <p:ph type="body" idx="1"/>
+          </p:nvPr>
+        </p:nvSpPr>
+        <p:spPr>
+          <a:xfrm>
+            <a:off x="5506280" y="1976424"/>
+            <a:ext cx="3339764" cy="3065400"/>
+          </a:xfrm>
+          <a:prstGeom prst="rect">
+            <a:avLst/>
+          </a:prstGeom>
+          <a:noFill/>
+          <a:ln>
+            <a:noFill/>
+          </a:ln>
+        </p:spPr>
+        <p:txBody>
+          <a:bodyPr spcFirstLastPara="1" wrap="square" lIns="0" tIns="34275" rIns="68575" bIns="34275" anchor="t" anchorCtr="0">
+            <a:normAutofit/>
+          </a:bodyPr>
+          <a:lstStyle/>
+          <a:p>
+            <a:pPr marL="0" lvl="0" indent="0" algn="l" rtl="0">
+              <a:lnSpc>
+                <a:spcPct val="100000"/>
+              </a:lnSpc>
+              <a:spcBef>
+                <a:spcPts val="600"/>
+              </a:spcBef>
+              <a:spcAft>
+                <a:spcPts val="0"/>
+              </a:spcAft>
+              <a:buClr>
+                <a:schemeClr val="dk2"/>
+              </a:buClr>
+              <a:buSzPts val="1100"/>
+              <a:buNone/>
+            </a:pPr>
+            <a:r>
+              <a:rPr lang="en" sz="1400" dirty="0"/>
+              <a:t>This visualization summarizes the ozone level by state and by month.</a:t>
+            </a:r>
+          </a:p>
+          <a:p>
+            <a:pPr marL="0" lvl="0" indent="0" algn="l" rtl="0">
+              <a:lnSpc>
+                <a:spcPct val="100000"/>
+              </a:lnSpc>
+              <a:spcBef>
+                <a:spcPts val="600"/>
+              </a:spcBef>
+              <a:spcAft>
+                <a:spcPts val="0"/>
+              </a:spcAft>
+              <a:buClr>
+                <a:schemeClr val="dk2"/>
+              </a:buClr>
+              <a:buSzPts val="1100"/>
+              <a:buNone/>
+            </a:pPr>
+            <a:r>
+              <a:rPr lang="en" sz="1400" dirty="0"/>
+              <a:t>California’s ozone levels have steaily increased since April 2021.</a:t>
+            </a:r>
+          </a:p>
+        </p:txBody>
+      </p:sp>
+      <p:sp>
+        <p:nvSpPr>
+          <p:cNvPr id="17" name="Google Shape;466;p74">
+            <a:extLst>
+              <a:ext uri="{FF2B5EF4-FFF2-40B4-BE49-F238E27FC236}">
+                <a16:creationId xmlns:a16="http://schemas.microsoft.com/office/drawing/2014/main" id="{ADBDCC2D-1F92-4943-B2A1-CAF50E8D6117}"/>
+              </a:ext>
+            </a:extLst>
+          </p:cNvPr>
+          <p:cNvSpPr txBox="1">
+            <a:spLocks noGrp="1"/>
+          </p:cNvSpPr>
+          <p:nvPr>
+            <p:ph type="body" idx="2"/>
+          </p:nvPr>
+        </p:nvSpPr>
+        <p:spPr>
+          <a:xfrm>
+            <a:off x="5388439" y="1691381"/>
+            <a:ext cx="3575447" cy="241426"/>
+          </a:xfrm>
+          <a:prstGeom prst="rect">
+            <a:avLst/>
+          </a:prstGeom>
+          <a:noFill/>
+          <a:ln>
+            <a:noFill/>
+          </a:ln>
+        </p:spPr>
+        <p:txBody>
+          <a:bodyPr spcFirstLastPara="1" wrap="square" lIns="0" tIns="34275" rIns="68575" bIns="34275" anchor="t" anchorCtr="0">
+            <a:normAutofit/>
+          </a:bodyPr>
+          <a:lstStyle/>
+          <a:p>
+            <a:pPr marL="0" lvl="0" indent="0" algn="ctr" rtl="0">
+              <a:lnSpc>
+                <a:spcPct val="90000"/>
+              </a:lnSpc>
+              <a:spcBef>
+                <a:spcPts val="0"/>
+              </a:spcBef>
+              <a:spcAft>
+                <a:spcPts val="0"/>
+              </a:spcAft>
+              <a:buClr>
+                <a:schemeClr val="dk2"/>
+              </a:buClr>
+              <a:buSzPts val="1100"/>
+              <a:buNone/>
+            </a:pPr>
+            <a:r>
+              <a:rPr lang="en" sz="1100" dirty="0"/>
+              <a:t>USING TABLEAU</a:t>
+            </a:r>
+            <a:endParaRPr sz="1100" dirty="0"/>
+          </a:p>
+        </p:txBody>
+      </p:sp>
+      <p:pic>
+        <p:nvPicPr>
+          <p:cNvPr id="4" name="Picture 3">
+            <a:extLst>
+              <a:ext uri="{FF2B5EF4-FFF2-40B4-BE49-F238E27FC236}">
+                <a16:creationId xmlns:a16="http://schemas.microsoft.com/office/drawing/2014/main" id="{F1CB69F3-F12E-49EA-8E0A-E234207A4C94}"/>
+              </a:ext>
+            </a:extLst>
+          </p:cNvPr>
+          <p:cNvPicPr>
+            <a:picLocks noChangeAspect="1"/>
+          </p:cNvPicPr>
+          <p:nvPr/>
+        </p:nvPicPr>
+        <p:blipFill>
+          <a:blip r:embed="rId3"/>
+          <a:stretch>
+            <a:fillRect/>
+          </a:stretch>
+        </p:blipFill>
+        <p:spPr>
+          <a:xfrm>
+            <a:off x="8928" y="1660149"/>
+            <a:ext cx="5340096" cy="2737690"/>
+          </a:xfrm>
+          <a:prstGeom prst="rect">
+            <a:avLst/>
+          </a:prstGeom>
+        </p:spPr>
+      </p:pic>
+    </p:spTree>
+    <p:extLst>
+      <p:ext uri="{BB962C8B-B14F-4D97-AF65-F5344CB8AC3E}">
+        <p14:creationId xmlns:p14="http://schemas.microsoft.com/office/powerpoint/2010/main" val="1111481105"/>
+      </p:ext>
+    </p:extLst>
+  </p:cSld>
+  <p:clrMapOvr>
+    <a:masterClrMapping/>
+  </p:clrMapOvr>
+</p:sld>
+</file>
+
+<file path=ppt/slides/slide13.xml><?xml version="1.0" encoding="utf-8"?>
 <p:sld xmlns:a="http://schemas.openxmlformats.org/drawingml/2006/main" xmlns:r="http://schemas.openxmlformats.org/officeDocument/2006/relationships" xmlns:p="http://schemas.openxmlformats.org/presentationml/2006/main">
   <p:cSld>
     <p:spTree>
@@ -45289,7 +46440,7 @@
 </p:sld>
 </file>
 
-<file path=ppt/slides/slide12.xml><?xml version="1.0" encoding="utf-8"?>
+<file path=ppt/slides/slide14.xml><?xml version="1.0" encoding="utf-8"?>
 <p:sld xmlns:a="http://schemas.openxmlformats.org/drawingml/2006/main" xmlns:r="http://schemas.openxmlformats.org/officeDocument/2006/relationships" xmlns:p="http://schemas.openxmlformats.org/presentationml/2006/main">
   <p:cSld>
     <p:spTree>
@@ -46417,10 +47568,10 @@
               <a:buNone/>
             </a:pPr>
             <a:r>
-              <a:rPr lang="en" sz="1100"/>
+              <a:rPr lang="en" sz="1100" dirty="0"/>
               <a:t>The U.S. Environmental Protection Agency (EPA) establishes an AQI for several major air pollutants regulated by the Clean Air Act. Each of these pollutants has a national air quality standard set by EPA to protect public health. </a:t>
             </a:r>
-            <a:endParaRPr sz="1100"/>
+            <a:endParaRPr sz="1100" dirty="0"/>
           </a:p>
           <a:p>
             <a:pPr marL="0" lvl="0" indent="0" algn="l" rtl="0">
@@ -46440,10 +47591,10 @@
               <a:buNone/>
             </a:pPr>
             <a:r>
-              <a:rPr lang="en" sz="1100"/>
+              <a:rPr lang="en" sz="1100" dirty="0"/>
               <a:t>As the world is battling global warming, our team decided to review and analyze AQIs for four different states. </a:t>
             </a:r>
-            <a:endParaRPr sz="1100"/>
+            <a:endParaRPr sz="1100" dirty="0"/>
           </a:p>
           <a:p>
             <a:pPr marL="0" lvl="0" indent="0" algn="l" rtl="0">
@@ -46463,14 +47614,14 @@
               <a:buNone/>
             </a:pPr>
             <a:r>
-              <a:rPr lang="en"/>
+              <a:rPr lang="en" dirty="0"/>
               <a:t>W</a:t>
             </a:r>
             <a:r>
-              <a:rPr lang="en" sz="1100"/>
+              <a:rPr lang="en" sz="1100" dirty="0"/>
               <a:t>e captured historical data on the following pollutants:</a:t>
             </a:r>
-            <a:endParaRPr sz="1100"/>
+            <a:endParaRPr sz="1100" dirty="0"/>
           </a:p>
           <a:p>
             <a:pPr marL="508000" lvl="1" indent="-196850" algn="l" rtl="0">
@@ -46490,10 +47641,10 @@
               <a:buChar char="•"/>
             </a:pPr>
             <a:r>
-              <a:rPr lang="en" sz="1300"/>
+              <a:rPr lang="en" sz="1300" dirty="0"/>
               <a:t>Carbon monoxide (CO)</a:t>
             </a:r>
-            <a:endParaRPr sz="1500"/>
+            <a:endParaRPr sz="1500" dirty="0"/>
           </a:p>
           <a:p>
             <a:pPr marL="508000" lvl="1" indent="-196850" algn="l" rtl="0">
@@ -46513,10 +47664,10 @@
               <a:buChar char="•"/>
             </a:pPr>
             <a:r>
-              <a:rPr lang="en" sz="1300"/>
+              <a:rPr lang="en" sz="1300" dirty="0"/>
               <a:t>Nitrogen monoxide (NO)</a:t>
             </a:r>
-            <a:endParaRPr sz="1500"/>
+            <a:endParaRPr sz="1500" dirty="0"/>
           </a:p>
           <a:p>
             <a:pPr marL="508000" lvl="1" indent="-196850" algn="l" rtl="0">
@@ -46536,10 +47687,10 @@
               <a:buChar char="•"/>
             </a:pPr>
             <a:r>
-              <a:rPr lang="en" sz="1300"/>
+              <a:rPr lang="en" sz="1300" dirty="0"/>
               <a:t>Nitrogen dioxide (NO2)</a:t>
             </a:r>
-            <a:endParaRPr sz="1500"/>
+            <a:endParaRPr sz="1500" dirty="0"/>
           </a:p>
           <a:p>
             <a:pPr marL="508000" lvl="1" indent="-196850" algn="l" rtl="0">
@@ -46559,10 +47710,10 @@
               <a:buChar char="•"/>
             </a:pPr>
             <a:r>
-              <a:rPr lang="en" sz="1300"/>
+              <a:rPr lang="en" sz="1300" dirty="0"/>
               <a:t>Ozone (O3)</a:t>
             </a:r>
-            <a:endParaRPr sz="1500"/>
+            <a:endParaRPr sz="1500" dirty="0"/>
           </a:p>
           <a:p>
             <a:pPr marL="508000" lvl="1" indent="-196850" algn="l" rtl="0">
@@ -46582,10 +47733,10 @@
               <a:buChar char="•"/>
             </a:pPr>
             <a:r>
-              <a:rPr lang="en" sz="1300"/>
+              <a:rPr lang="en" sz="1300" dirty="0"/>
               <a:t>Sulphur dioxide (SO2)</a:t>
             </a:r>
-            <a:endParaRPr sz="1500"/>
+            <a:endParaRPr sz="1500" dirty="0"/>
           </a:p>
           <a:p>
             <a:pPr marL="508000" lvl="1" indent="-196850" algn="l" rtl="0">
@@ -46605,10 +47756,10 @@
               <a:buChar char="•"/>
             </a:pPr>
             <a:r>
-              <a:rPr lang="en" sz="1300"/>
+              <a:rPr lang="en" sz="1300" dirty="0"/>
               <a:t>Ammonia (NH3)</a:t>
             </a:r>
-            <a:endParaRPr sz="1500"/>
+            <a:endParaRPr sz="1500" dirty="0"/>
           </a:p>
           <a:p>
             <a:pPr marL="508000" lvl="1" indent="-196850" algn="l" rtl="0">
@@ -46628,10 +47779,10 @@
               <a:buChar char="•"/>
             </a:pPr>
             <a:r>
-              <a:rPr lang="en" sz="1300"/>
+              <a:rPr lang="en" sz="1300" dirty="0"/>
               <a:t>Particle pollution (also known as particulate matter, specifically PM2.5 and PM10)</a:t>
             </a:r>
-            <a:endParaRPr sz="1500"/>
+            <a:endParaRPr sz="1500" dirty="0"/>
           </a:p>
           <a:p>
             <a:pPr marL="0" lvl="0" indent="0" algn="l" rtl="0">
@@ -46650,7 +47801,7 @@
               <a:buSzPts val="1100"/>
               <a:buNone/>
             </a:pPr>
-            <a:endParaRPr sz="1100"/>
+            <a:endParaRPr sz="1100" dirty="0"/>
           </a:p>
         </p:txBody>
       </p:sp>
@@ -47107,10 +48258,10 @@
               <a:buChar char="•"/>
             </a:pPr>
             <a:r>
-              <a:rPr lang="en"/>
+              <a:rPr lang="en" dirty="0"/>
               <a:t>Historical data is accessible from 27th November 2020</a:t>
             </a:r>
-            <a:endParaRPr sz="1300"/>
+            <a:endParaRPr sz="1300" dirty="0"/>
           </a:p>
           <a:p>
             <a:pPr marL="177800" lvl="0" indent="-184150" algn="l" rtl="0">
@@ -47130,10 +48281,10 @@
               <a:buChar char="•"/>
             </a:pPr>
             <a:r>
-              <a:rPr lang="en"/>
+              <a:rPr lang="en" dirty="0"/>
               <a:t>We pulled latitudes and longitudes from all US states in a separate CSV and used this data to capture the lat/long coordinates of the center of our 4 selected states:</a:t>
             </a:r>
-            <a:endParaRPr sz="1300"/>
+            <a:endParaRPr sz="1300" dirty="0"/>
           </a:p>
           <a:p>
             <a:pPr marL="342900" lvl="1" indent="-177800" algn="l" rtl="0">
@@ -47153,10 +48304,10 @@
               <a:buChar char="•"/>
             </a:pPr>
             <a:r>
-              <a:rPr lang="en" sz="1000"/>
+              <a:rPr lang="en" sz="1000" dirty="0"/>
               <a:t>Alaska</a:t>
             </a:r>
-            <a:endParaRPr sz="1300"/>
+            <a:endParaRPr sz="1300" dirty="0"/>
           </a:p>
           <a:p>
             <a:pPr marL="342900" lvl="1" indent="-177800" algn="l" rtl="0">
@@ -47176,10 +48327,10 @@
               <a:buChar char="•"/>
             </a:pPr>
             <a:r>
-              <a:rPr lang="en" sz="1000"/>
+              <a:rPr lang="en" sz="1000" dirty="0"/>
               <a:t>California</a:t>
             </a:r>
-            <a:endParaRPr sz="1300"/>
+            <a:endParaRPr sz="1300" dirty="0"/>
           </a:p>
           <a:p>
             <a:pPr marL="342900" lvl="1" indent="-177800" algn="l" rtl="0">
@@ -47199,10 +48350,10 @@
               <a:buChar char="•"/>
             </a:pPr>
             <a:r>
-              <a:rPr lang="en" sz="1000"/>
+              <a:rPr lang="en" sz="1000" dirty="0"/>
               <a:t>Washington, DC</a:t>
             </a:r>
-            <a:endParaRPr sz="1300"/>
+            <a:endParaRPr sz="1300" dirty="0"/>
           </a:p>
           <a:p>
             <a:pPr marL="342900" lvl="1" indent="-177800" algn="l" rtl="0">
@@ -47222,10 +48373,10 @@
               <a:buChar char="•"/>
             </a:pPr>
             <a:r>
-              <a:rPr lang="en" sz="1000"/>
+              <a:rPr lang="en" sz="1000" dirty="0"/>
               <a:t>Massachusetts</a:t>
             </a:r>
-            <a:endParaRPr sz="1300"/>
+            <a:endParaRPr sz="1300" dirty="0"/>
           </a:p>
           <a:p>
             <a:pPr marL="177800" lvl="0" indent="-184150" algn="l" rtl="0">
@@ -47245,10 +48396,10 @@
               <a:buChar char="•"/>
             </a:pPr>
             <a:r>
-              <a:rPr lang="en"/>
+              <a:rPr lang="en" dirty="0"/>
               <a:t>We then created 4 different API requests for the 4 states and captured the AQI data into a separate CSV, which we then loaded into Tableau for visualization purposes</a:t>
             </a:r>
-            <a:endParaRPr sz="1300"/>
+            <a:endParaRPr sz="1300" dirty="0"/>
           </a:p>
         </p:txBody>
       </p:sp>
@@ -48050,7 +49201,7 @@
               <a:buSzPts val="1100"/>
               <a:buNone/>
             </a:pPr>
-            <a:endParaRPr sz="1300"/>
+            <a:endParaRPr sz="1300" dirty="0"/>
           </a:p>
           <a:p>
             <a:pPr marL="0" lvl="0" indent="0" algn="l" rtl="0">
@@ -48065,7 +49216,7 @@
               </a:spcAft>
               <a:buNone/>
             </a:pPr>
-            <a:endParaRPr sz="1300"/>
+            <a:endParaRPr sz="1300" dirty="0"/>
           </a:p>
           <a:p>
             <a:pPr marL="0" lvl="0" indent="0" algn="l" rtl="0">
@@ -48085,10 +49236,10 @@
               <a:buNone/>
             </a:pPr>
             <a:r>
-              <a:rPr lang="en" sz="1300"/>
+              <a:rPr lang="en" sz="1300" dirty="0"/>
               <a:t>By running various machine learning models, we are trying to assess whether specific pollutants have more or less impact of the AQI. </a:t>
             </a:r>
-            <a:endParaRPr sz="1300"/>
+            <a:endParaRPr sz="1300" dirty="0"/>
           </a:p>
           <a:p>
             <a:pPr marL="0" lvl="0" indent="0" algn="l" rtl="0">
@@ -48107,7 +49258,7 @@
               <a:buSzPts val="1100"/>
               <a:buNone/>
             </a:pPr>
-            <a:endParaRPr sz="1300"/>
+            <a:endParaRPr sz="1300" dirty="0"/>
           </a:p>
           <a:p>
             <a:pPr marL="0" lvl="0" indent="0" algn="l" rtl="0">
@@ -48127,10 +49278,10 @@
               <a:buNone/>
             </a:pPr>
             <a:r>
-              <a:rPr lang="en" sz="1300"/>
+              <a:rPr lang="en" sz="1300" dirty="0"/>
               <a:t>Moreover, we want to compare various states’ pollutants to see if there are any trends at the state level.</a:t>
             </a:r>
-            <a:endParaRPr sz="1300"/>
+            <a:endParaRPr sz="1300" dirty="0"/>
           </a:p>
           <a:p>
             <a:pPr marL="0" lvl="0" indent="0" algn="l" rtl="0">
@@ -48149,7 +49300,7 @@
               <a:buSzPts val="1100"/>
               <a:buNone/>
             </a:pPr>
-            <a:endParaRPr sz="1100"/>
+            <a:endParaRPr sz="1100" dirty="0"/>
           </a:p>
         </p:txBody>
       </p:sp>
@@ -48199,10 +49350,10 @@
               <a:buNone/>
             </a:pPr>
             <a:r>
-              <a:rPr lang="en" sz="1600"/>
+              <a:rPr lang="en" sz="1600" dirty="0"/>
               <a:t>Air Quality Index (AQI) Analysis</a:t>
             </a:r>
-            <a:endParaRPr sz="1300"/>
+            <a:endParaRPr sz="1300" dirty="0"/>
           </a:p>
         </p:txBody>
       </p:sp>
@@ -48414,7 +49565,7 @@
         </p:nvSpPr>
         <p:spPr>
           <a:xfrm>
-            <a:off x="4972049" y="630000"/>
+            <a:off x="5214162" y="630000"/>
             <a:ext cx="3924000" cy="1006500"/>
           </a:xfrm>
           <a:prstGeom prst="rect">
@@ -48458,7 +49609,31 @@
                 <a:cs typeface="Arial"/>
                 <a:sym typeface="Arial"/>
               </a:rPr>
-              <a:t>Historical AQI By State</a:t>
+              <a:t>Selected States for our AQI A</a:t>
+            </a:r>
+            <a:r>
+              <a:rPr lang="en-US" dirty="0">
+                <a:solidFill>
+                  <a:srgbClr val="5DAAB0"/>
+                </a:solidFill>
+                <a:latin typeface="Arial"/>
+                <a:ea typeface="Arial"/>
+                <a:cs typeface="Arial"/>
+                <a:sym typeface="Arial"/>
+              </a:rPr>
+              <a:t>n</a:t>
+            </a:r>
+            <a:r>
+              <a:rPr lang="en" dirty="0">
+                <a:solidFill>
+                  <a:srgbClr val="5DAAB0"/>
+                </a:solidFill>
+                <a:latin typeface="Arial"/>
+                <a:ea typeface="Arial"/>
+                <a:cs typeface="Arial"/>
+                <a:sym typeface="Arial"/>
+              </a:rPr>
+              <a:t>alysis</a:t>
             </a:r>
             <a:endParaRPr dirty="0"/>
           </a:p>
@@ -48476,8 +49651,8 @@
         </p:nvSpPr>
         <p:spPr>
           <a:xfrm>
-            <a:off x="5093074" y="1976424"/>
-            <a:ext cx="3822300" cy="3065400"/>
+            <a:off x="5506280" y="1976424"/>
+            <a:ext cx="3339764" cy="3065400"/>
           </a:xfrm>
           <a:prstGeom prst="rect">
             <a:avLst/>
@@ -48498,7 +49673,7 @@
                 <a:spcPct val="100000"/>
               </a:lnSpc>
               <a:spcBef>
-                <a:spcPts val="0"/>
+                <a:spcPts val="600"/>
               </a:spcBef>
               <a:spcAft>
                 <a:spcPts val="0"/>
@@ -48510,10 +49685,101 @@
               <a:buNone/>
             </a:pPr>
             <a:r>
-              <a:rPr lang="en" sz="1560" dirty="0"/>
-              <a:t>This visualization summarizes the Air Quality Index (AQI) score by month and by state since November 2020.</a:t>
+              <a:rPr lang="en" sz="1400" dirty="0"/>
+              <a:t>Our team selected four states for comparison purposes:</a:t>
             </a:r>
-            <a:endParaRPr sz="1560" dirty="0"/>
+          </a:p>
+          <a:p>
+            <a:pPr marL="460375" lvl="0" indent="-233363" algn="l" rtl="0">
+              <a:lnSpc>
+                <a:spcPct val="100000"/>
+              </a:lnSpc>
+              <a:spcBef>
+                <a:spcPts val="600"/>
+              </a:spcBef>
+              <a:spcAft>
+                <a:spcPts val="0"/>
+              </a:spcAft>
+              <a:buClr>
+                <a:schemeClr val="dk2"/>
+              </a:buClr>
+              <a:buSzPts val="1100"/>
+              <a:buFont typeface="Arial" panose="020B0604020202020204" pitchFamily="34" charset="0"/>
+              <a:buChar char="•"/>
+            </a:pPr>
+            <a:r>
+              <a:rPr lang="en" sz="1200" dirty="0"/>
+              <a:t>Alaska</a:t>
+            </a:r>
+          </a:p>
+          <a:p>
+            <a:pPr marL="460375" lvl="0" indent="-233363" algn="l" rtl="0">
+              <a:lnSpc>
+                <a:spcPct val="100000"/>
+              </a:lnSpc>
+              <a:spcBef>
+                <a:spcPts val="600"/>
+              </a:spcBef>
+              <a:spcAft>
+                <a:spcPts val="0"/>
+              </a:spcAft>
+              <a:buClr>
+                <a:schemeClr val="dk2"/>
+              </a:buClr>
+              <a:buSzPts val="1100"/>
+              <a:buFont typeface="Arial" panose="020B0604020202020204" pitchFamily="34" charset="0"/>
+              <a:buChar char="•"/>
+            </a:pPr>
+            <a:r>
+              <a:rPr lang="en" sz="1200" dirty="0"/>
+              <a:t>California</a:t>
+            </a:r>
+          </a:p>
+          <a:p>
+            <a:pPr marL="460375" lvl="0" indent="-233363" algn="l" rtl="0">
+              <a:lnSpc>
+                <a:spcPct val="100000"/>
+              </a:lnSpc>
+              <a:spcBef>
+                <a:spcPts val="600"/>
+              </a:spcBef>
+              <a:spcAft>
+                <a:spcPts val="0"/>
+              </a:spcAft>
+              <a:buClr>
+                <a:schemeClr val="dk2"/>
+              </a:buClr>
+              <a:buSzPts val="1100"/>
+              <a:buFont typeface="Arial" panose="020B0604020202020204" pitchFamily="34" charset="0"/>
+              <a:buChar char="•"/>
+            </a:pPr>
+            <a:r>
+              <a:rPr lang="en" sz="1200" dirty="0"/>
+              <a:t>Washington, DC</a:t>
+            </a:r>
+          </a:p>
+          <a:p>
+            <a:pPr marL="460375" lvl="0" indent="-233363" algn="l" rtl="0">
+              <a:lnSpc>
+                <a:spcPct val="100000"/>
+              </a:lnSpc>
+              <a:spcBef>
+                <a:spcPts val="600"/>
+              </a:spcBef>
+              <a:spcAft>
+                <a:spcPts val="0"/>
+              </a:spcAft>
+              <a:buClr>
+                <a:schemeClr val="dk2"/>
+              </a:buClr>
+              <a:buSzPts val="1100"/>
+              <a:buFont typeface="Arial" panose="020B0604020202020204" pitchFamily="34" charset="0"/>
+              <a:buChar char="•"/>
+            </a:pPr>
+            <a:r>
+              <a:rPr lang="en" sz="1200" dirty="0"/>
+              <a:t>Massachusetts</a:t>
+            </a:r>
           </a:p>
           <a:p>
             <a:pPr marL="0" lvl="0" indent="0" algn="l" rtl="0">
@@ -48521,7 +49787,7 @@
                 <a:spcPct val="100000"/>
               </a:lnSpc>
               <a:spcBef>
-                <a:spcPts val="800"/>
+                <a:spcPts val="600"/>
               </a:spcBef>
               <a:spcAft>
                 <a:spcPts val="0"/>
@@ -48533,67 +49799,10 @@
               <a:buNone/>
             </a:pPr>
             <a:r>
-              <a:rPr lang="en" sz="1560" dirty="0"/>
-              <a:t>Average AQIs have been steady between November 2020 and July 2021, with a significant increase in August 2021, particularly in California (that is likely due to the fire activity across the state in the summer of 2021).</a:t>
+              <a:rPr lang="en" sz="1400" dirty="0"/>
+              <a:t>This visualization summarizes the Air Quality Index (AQI) score by month and by state since November 2020.</a:t>
             </a:r>
-            <a:endParaRPr sz="1560" dirty="0"/>
-          </a:p>
-          <a:p>
-            <a:pPr marL="0" lvl="0" indent="0" algn="l" rtl="0">
-              <a:lnSpc>
-                <a:spcPct val="100000"/>
-              </a:lnSpc>
-              <a:spcBef>
-                <a:spcPts val="800"/>
-              </a:spcBef>
-              <a:spcAft>
-                <a:spcPts val="0"/>
-              </a:spcAft>
-              <a:buClr>
-                <a:schemeClr val="dk2"/>
-              </a:buClr>
-              <a:buSzPts val="1100"/>
-              <a:buNone/>
-            </a:pPr>
-            <a:endParaRPr sz="1100" dirty="0"/>
-          </a:p>
-          <a:p>
-            <a:pPr marL="0" lvl="0" indent="0" algn="l" rtl="0">
-              <a:lnSpc>
-                <a:spcPct val="100000"/>
-              </a:lnSpc>
-              <a:spcBef>
-                <a:spcPts val="800"/>
-              </a:spcBef>
-              <a:spcAft>
-                <a:spcPts val="0"/>
-              </a:spcAft>
-              <a:buClr>
-                <a:schemeClr val="dk2"/>
-              </a:buClr>
-              <a:buSzPts val="1100"/>
-              <a:buNone/>
-            </a:pPr>
-            <a:endParaRPr sz="1100" dirty="0"/>
-          </a:p>
-          <a:p>
-            <a:pPr marL="0" lvl="0" indent="0" algn="l" rtl="0">
-              <a:lnSpc>
-                <a:spcPct val="100000"/>
-              </a:lnSpc>
-              <a:spcBef>
-                <a:spcPts val="800"/>
-              </a:spcBef>
-              <a:spcAft>
-                <a:spcPts val="0"/>
-              </a:spcAft>
-              <a:buClr>
-                <a:schemeClr val="dk2"/>
-              </a:buClr>
-              <a:buSzPts val="1100"/>
-              <a:buNone/>
-            </a:pPr>
-            <a:endParaRPr sz="1100" dirty="0"/>
+            <a:endParaRPr sz="1400" dirty="0"/>
           </a:p>
         </p:txBody>
       </p:sp>
@@ -48609,7 +49818,7 @@
         </p:nvSpPr>
         <p:spPr>
           <a:xfrm>
-            <a:off x="5093085" y="1685759"/>
+            <a:off x="5388439" y="1691381"/>
             <a:ext cx="3575447" cy="241426"/>
           </a:xfrm>
           <a:prstGeom prst="rect">
@@ -48650,31 +49859,69 @@
           </a:p>
         </p:txBody>
       </p:sp>
-      <p:pic>
-        <p:nvPicPr>
-          <p:cNvPr id="467" name="Google Shape;467;p74" title="Web Viewer"/>
-          <p:cNvPicPr preferRelativeResize="0"/>
+      <p:sp>
+        <p:nvSpPr>
+          <p:cNvPr id="2" name="TextBox 1">
+            <a:extLst>
+              <a:ext uri="{FF2B5EF4-FFF2-40B4-BE49-F238E27FC236}">
+                <a16:creationId xmlns:a16="http://schemas.microsoft.com/office/drawing/2014/main" id="{652A84E4-554A-4088-BEE6-1A777E8D4EA5}"/>
+              </a:ext>
+            </a:extLst>
+          </p:cNvPr>
+          <p:cNvSpPr txBox="1"/>
           <p:nvPr/>
-        </p:nvPicPr>
-        <p:blipFill rotWithShape="1">
-          <a:blip r:embed="rId3">
-            <a:alphaModFix/>
-          </a:blip>
-          <a:srcRect/>
-          <a:stretch/>
-        </p:blipFill>
+        </p:nvSpPr>
         <p:spPr>
           <a:xfrm>
-            <a:off x="114300" y="800100"/>
-            <a:ext cx="4857750" cy="3796841"/>
+            <a:off x="532737" y="4767041"/>
+            <a:ext cx="8094428" cy="261610"/>
           </a:xfrm>
           <a:prstGeom prst="rect">
             <a:avLst/>
           </a:prstGeom>
           <a:noFill/>
-          <a:ln>
-            <a:noFill/>
-          </a:ln>
+        </p:spPr>
+        <p:txBody>
+          <a:bodyPr wrap="square" rtlCol="0">
+            <a:spAutoFit/>
+          </a:bodyPr>
+          <a:lstStyle/>
+          <a:p>
+            <a:r>
+              <a:rPr lang="en-US" sz="1100" i="1" dirty="0"/>
+              <a:t>Tableau Story Link: https://public.tableau.com/app/profile/elo.sla/viz/Final_Project_AQI_Story/AQIStory?publish=yes</a:t>
+            </a:r>
+          </a:p>
+        </p:txBody>
+      </p:sp>
+      <p:pic>
+        <p:nvPicPr>
+          <p:cNvPr id="6" name="Picture 5">
+            <a:extLst>
+              <a:ext uri="{FF2B5EF4-FFF2-40B4-BE49-F238E27FC236}">
+                <a16:creationId xmlns:a16="http://schemas.microsoft.com/office/drawing/2014/main" id="{0E4E9D4A-B67D-48C4-B79D-BE2B6474CD46}"/>
+              </a:ext>
+            </a:extLst>
+          </p:cNvPr>
+          <p:cNvPicPr>
+            <a:picLocks noChangeAspect="1"/>
+          </p:cNvPicPr>
+          <p:nvPr/>
+        </p:nvPicPr>
+        <p:blipFill>
+          <a:blip r:embed="rId3"/>
+          <a:stretch>
+            <a:fillRect/>
+          </a:stretch>
+        </p:blipFill>
+        <p:spPr>
+          <a:xfrm>
+            <a:off x="-1273" y="1667018"/>
+            <a:ext cx="5340096" cy="2785982"/>
+          </a:xfrm>
+          <a:prstGeom prst="rect">
+            <a:avLst/>
+          </a:prstGeom>
         </p:spPr>
       </p:pic>
     </p:spTree>
@@ -49526,18 +50773,4 @@
   <a:objectDefaults/>
   <a:extraClrSchemeLst/>
 </a:theme>
-</file>
-
-<file path=ppt/webextensions/webextension1.xml><?xml version="1.0" encoding="utf-8"?>
-<we:webextension xmlns:we="http://schemas.microsoft.com/office/webextensions/webextension/2010/11" id="{F549780A-B7FF-4B64-B662-ACF7319DA038}">
-  <we:reference id="wa104295828" version="1.9.0.0" store="en-US" storeType="OMEX"/>
-  <we:alternateReferences>
-    <we:reference id="wa104295828" version="1.9.0.0" store="wa104295828" storeType="OMEX"/>
-  </we:alternateReferences>
-  <we:properties>
-    <we:property name="__labs__" value="{&quot;configuration&quot;:{&quot;appVersion&quot;:{&quot;major&quot;:1,&quot;minor&quot;:0},&quot;components&quot;:[{&quot;type&quot;:&quot;Labs.Components.ActivityComponent&quot;,&quot;name&quot;:&quot;public.tableau.com/views/Final_Project_AQI_Story/AQIStory?:language=en-US&amp;publish=yes&amp;:display_count=n&amp;:origin=viz_share_link&quot;,&quot;values&quot;:{},&quot;data&quot;:{&quot;uri&quot;:&quot;public.tableau.com/views/Final_Project_AQI_Story/AQIStory?:language=en-US&amp;publish=yes&amp;:display_count=n&amp;:origin=viz_share_link&quot;},&quot;secure&quot;:false}],&quot;name&quot;:&quot;public.tableau.com/views/Final_Project_AQI_Story/AQIStory?:language=en-US&amp;publish=yes&amp;:display_count=n&amp;:origin=viz_share_link&quot;,&quot;timeline&quot;:null,&quot;analytics&quot;:null},&quot;hostVersion&quot;:{&quot;major&quot;:0,&quot;minor&quot;:1}}"/>
-  </we:properties>
-  <we:bindings/>
-  <we:snapshot xmlns:r="http://schemas.openxmlformats.org/officeDocument/2006/relationships" r:embed="rId1"/>
-</we:webextension>
 </file>
</xml_diff>

<commit_message>
Update Sep 26  8PM
</commit_message>
<xml_diff>
--- a/OpenWeather_AQI_Presentation_Final.pptx
+++ b/OpenWeather_AQI_Presentation_Final.pptx
@@ -282,955 +282,6 @@
     </p:ext>
   </p:extLst>
 </p:presentation>
-</file>
-
-<file path=ppt/revisionInfo.xml><?xml version="1.0" encoding="utf-8"?>
-<p1510:revInfo xmlns:a="http://schemas.openxmlformats.org/drawingml/2006/main" xmlns:r="http://schemas.openxmlformats.org/officeDocument/2006/relationships" xmlns:p1510="http://schemas.microsoft.com/office/powerpoint/2015/10/main">
-  <p1510:revLst>
-    <p1510:client id="{79719C05-BB10-4FCC-B2CE-0EC3DC887679}" v="4" dt="2021-09-25T15:05:48.707"/>
-    <p1510:client id="{8DF0BD16-E9E4-47A1-AF8C-2DAF4C310ECB}" v="18" dt="2021-09-26T14:21:16.753"/>
-  </p1510:revLst>
-</p1510:revInfo>
-</file>
-
-<file path=ppt/changesInfos/changesInfo1.xml><?xml version="1.0" encoding="utf-8"?>
-<pc:chgInfo xmlns:a="http://schemas.openxmlformats.org/drawingml/2006/main" xmlns:r="http://schemas.openxmlformats.org/officeDocument/2006/relationships" xmlns:ac="http://schemas.microsoft.com/office/drawing/2013/main/command" xmlns:pc="http://schemas.microsoft.com/office/powerpoint/2013/main/command">
-  <pc:docChgLst>
-    <pc:chgData name="elodiecslawinski@gmail.com" userId="2d9956b1ce3ed99c" providerId="LiveId" clId="{8DF0BD16-E9E4-47A1-AF8C-2DAF4C310ECB}"/>
-    <pc:docChg chg="undo custSel addSld delSld modSld sldOrd">
-      <pc:chgData name="elodiecslawinski@gmail.com" userId="2d9956b1ce3ed99c" providerId="LiveId" clId="{8DF0BD16-E9E4-47A1-AF8C-2DAF4C310ECB}" dt="2021-09-26T14:21:31.376" v="2040" actId="20577"/>
-      <pc:docMkLst>
-        <pc:docMk/>
-      </pc:docMkLst>
-      <pc:sldChg chg="modNotesTx">
-        <pc:chgData name="elodiecslawinski@gmail.com" userId="2d9956b1ce3ed99c" providerId="LiveId" clId="{8DF0BD16-E9E4-47A1-AF8C-2DAF4C310ECB}" dt="2021-09-26T13:56:32.566" v="624" actId="20577"/>
-        <pc:sldMkLst>
-          <pc:docMk/>
-          <pc:sldMk cId="0" sldId="256"/>
-        </pc:sldMkLst>
-      </pc:sldChg>
-      <pc:sldChg chg="addSp delSp modSp mod modNotesTx">
-        <pc:chgData name="elodiecslawinski@gmail.com" userId="2d9956b1ce3ed99c" providerId="LiveId" clId="{8DF0BD16-E9E4-47A1-AF8C-2DAF4C310ECB}" dt="2021-09-26T13:58:01.748" v="876" actId="20577"/>
-        <pc:sldMkLst>
-          <pc:docMk/>
-          <pc:sldMk cId="0" sldId="257"/>
-        </pc:sldMkLst>
-        <pc:spChg chg="add mod">
-          <ac:chgData name="elodiecslawinski@gmail.com" userId="2d9956b1ce3ed99c" providerId="LiveId" clId="{8DF0BD16-E9E4-47A1-AF8C-2DAF4C310ECB}" dt="2021-09-26T13:51:10.226" v="332" actId="1076"/>
-          <ac:spMkLst>
-            <pc:docMk/>
-            <pc:sldMk cId="0" sldId="257"/>
-            <ac:spMk id="2" creationId="{770FA4D5-3527-4DFD-84DC-2A9F29CA14AB}"/>
-          </ac:spMkLst>
-        </pc:spChg>
-        <pc:spChg chg="add mod">
-          <ac:chgData name="elodiecslawinski@gmail.com" userId="2d9956b1ce3ed99c" providerId="LiveId" clId="{8DF0BD16-E9E4-47A1-AF8C-2DAF4C310ECB}" dt="2021-09-26T13:51:07.449" v="331" actId="1076"/>
-          <ac:spMkLst>
-            <pc:docMk/>
-            <pc:sldMk cId="0" sldId="257"/>
-            <ac:spMk id="12" creationId="{6C0FDC71-924D-4EAF-A4B8-1C418352D9BA}"/>
-          </ac:spMkLst>
-        </pc:spChg>
-        <pc:spChg chg="add mod">
-          <ac:chgData name="elodiecslawinski@gmail.com" userId="2d9956b1ce3ed99c" providerId="LiveId" clId="{8DF0BD16-E9E4-47A1-AF8C-2DAF4C310ECB}" dt="2021-09-26T13:51:02.023" v="330" actId="1076"/>
-          <ac:spMkLst>
-            <pc:docMk/>
-            <pc:sldMk cId="0" sldId="257"/>
-            <ac:spMk id="13" creationId="{52E6AA52-DBE4-4E9D-BDC1-BDAE6B4FA3A4}"/>
-          </ac:spMkLst>
-        </pc:spChg>
-        <pc:spChg chg="add mod">
-          <ac:chgData name="elodiecslawinski@gmail.com" userId="2d9956b1ce3ed99c" providerId="LiveId" clId="{8DF0BD16-E9E4-47A1-AF8C-2DAF4C310ECB}" dt="2021-09-26T13:50:59.294" v="329" actId="1076"/>
-          <ac:spMkLst>
-            <pc:docMk/>
-            <pc:sldMk cId="0" sldId="257"/>
-            <ac:spMk id="14" creationId="{66B02EF3-B686-4351-A8CE-1A463620A535}"/>
-          </ac:spMkLst>
-        </pc:spChg>
-        <pc:spChg chg="mod">
-          <ac:chgData name="elodiecslawinski@gmail.com" userId="2d9956b1ce3ed99c" providerId="LiveId" clId="{8DF0BD16-E9E4-47A1-AF8C-2DAF4C310ECB}" dt="2021-09-26T13:51:19.738" v="333" actId="108"/>
-          <ac:spMkLst>
-            <pc:docMk/>
-            <pc:sldMk cId="0" sldId="257"/>
-            <ac:spMk id="393" creationId="{00000000-0000-0000-0000-000000000000}"/>
-          </ac:spMkLst>
-        </pc:spChg>
-        <pc:spChg chg="add del">
-          <ac:chgData name="elodiecslawinski@gmail.com" userId="2d9956b1ce3ed99c" providerId="LiveId" clId="{8DF0BD16-E9E4-47A1-AF8C-2DAF4C310ECB}" dt="2021-09-26T13:39:04.915" v="4" actId="478"/>
-          <ac:spMkLst>
-            <pc:docMk/>
-            <pc:sldMk cId="0" sldId="257"/>
-            <ac:spMk id="394" creationId="{00000000-0000-0000-0000-000000000000}"/>
-          </ac:spMkLst>
-        </pc:spChg>
-        <pc:spChg chg="del">
-          <ac:chgData name="elodiecslawinski@gmail.com" userId="2d9956b1ce3ed99c" providerId="LiveId" clId="{8DF0BD16-E9E4-47A1-AF8C-2DAF4C310ECB}" dt="2021-09-26T13:39:35.060" v="15" actId="478"/>
-          <ac:spMkLst>
-            <pc:docMk/>
-            <pc:sldMk cId="0" sldId="257"/>
-            <ac:spMk id="395" creationId="{00000000-0000-0000-0000-000000000000}"/>
-          </ac:spMkLst>
-        </pc:spChg>
-        <pc:spChg chg="del">
-          <ac:chgData name="elodiecslawinski@gmail.com" userId="2d9956b1ce3ed99c" providerId="LiveId" clId="{8DF0BD16-E9E4-47A1-AF8C-2DAF4C310ECB}" dt="2021-09-26T13:39:35.756" v="16" actId="478"/>
-          <ac:spMkLst>
-            <pc:docMk/>
-            <pc:sldMk cId="0" sldId="257"/>
-            <ac:spMk id="396" creationId="{00000000-0000-0000-0000-000000000000}"/>
-          </ac:spMkLst>
-        </pc:spChg>
-        <pc:spChg chg="del">
-          <ac:chgData name="elodiecslawinski@gmail.com" userId="2d9956b1ce3ed99c" providerId="LiveId" clId="{8DF0BD16-E9E4-47A1-AF8C-2DAF4C310ECB}" dt="2021-09-26T13:39:36.788" v="17" actId="478"/>
-          <ac:spMkLst>
-            <pc:docMk/>
-            <pc:sldMk cId="0" sldId="257"/>
-            <ac:spMk id="397" creationId="{00000000-0000-0000-0000-000000000000}"/>
-          </ac:spMkLst>
-        </pc:spChg>
-        <pc:spChg chg="mod">
-          <ac:chgData name="elodiecslawinski@gmail.com" userId="2d9956b1ce3ed99c" providerId="LiveId" clId="{8DF0BD16-E9E4-47A1-AF8C-2DAF4C310ECB}" dt="2021-09-26T13:57:18.270" v="734" actId="14100"/>
-          <ac:spMkLst>
-            <pc:docMk/>
-            <pc:sldMk cId="0" sldId="257"/>
-            <ac:spMk id="398" creationId="{00000000-0000-0000-0000-000000000000}"/>
-          </ac:spMkLst>
-        </pc:spChg>
-        <pc:spChg chg="mod">
-          <ac:chgData name="elodiecslawinski@gmail.com" userId="2d9956b1ce3ed99c" providerId="LiveId" clId="{8DF0BD16-E9E4-47A1-AF8C-2DAF4C310ECB}" dt="2021-09-26T13:57:18.270" v="734" actId="14100"/>
-          <ac:spMkLst>
-            <pc:docMk/>
-            <pc:sldMk cId="0" sldId="257"/>
-            <ac:spMk id="399" creationId="{00000000-0000-0000-0000-000000000000}"/>
-          </ac:spMkLst>
-        </pc:spChg>
-        <pc:spChg chg="mod">
-          <ac:chgData name="elodiecslawinski@gmail.com" userId="2d9956b1ce3ed99c" providerId="LiveId" clId="{8DF0BD16-E9E4-47A1-AF8C-2DAF4C310ECB}" dt="2021-09-26T13:57:18.270" v="734" actId="14100"/>
-          <ac:spMkLst>
-            <pc:docMk/>
-            <pc:sldMk cId="0" sldId="257"/>
-            <ac:spMk id="400" creationId="{00000000-0000-0000-0000-000000000000}"/>
-          </ac:spMkLst>
-        </pc:spChg>
-        <pc:spChg chg="mod">
-          <ac:chgData name="elodiecslawinski@gmail.com" userId="2d9956b1ce3ed99c" providerId="LiveId" clId="{8DF0BD16-E9E4-47A1-AF8C-2DAF4C310ECB}" dt="2021-09-26T13:57:18.270" v="734" actId="14100"/>
-          <ac:spMkLst>
-            <pc:docMk/>
-            <pc:sldMk cId="0" sldId="257"/>
-            <ac:spMk id="401" creationId="{00000000-0000-0000-0000-000000000000}"/>
-          </ac:spMkLst>
-        </pc:spChg>
-      </pc:sldChg>
-      <pc:sldChg chg="modNotesTx">
-        <pc:chgData name="elodiecslawinski@gmail.com" userId="2d9956b1ce3ed99c" providerId="LiveId" clId="{8DF0BD16-E9E4-47A1-AF8C-2DAF4C310ECB}" dt="2021-09-26T13:58:22.028" v="881" actId="20577"/>
-        <pc:sldMkLst>
-          <pc:docMk/>
-          <pc:sldMk cId="0" sldId="258"/>
-        </pc:sldMkLst>
-      </pc:sldChg>
-      <pc:sldChg chg="modSp mod modNotesTx">
-        <pc:chgData name="elodiecslawinski@gmail.com" userId="2d9956b1ce3ed99c" providerId="LiveId" clId="{8DF0BD16-E9E4-47A1-AF8C-2DAF4C310ECB}" dt="2021-09-26T14:00:51.149" v="1235" actId="20577"/>
-        <pc:sldMkLst>
-          <pc:docMk/>
-          <pc:sldMk cId="0" sldId="259"/>
-        </pc:sldMkLst>
-        <pc:spChg chg="mod">
-          <ac:chgData name="elodiecslawinski@gmail.com" userId="2d9956b1ce3ed99c" providerId="LiveId" clId="{8DF0BD16-E9E4-47A1-AF8C-2DAF4C310ECB}" dt="2021-09-26T13:40:12.796" v="30" actId="404"/>
-          <ac:spMkLst>
-            <pc:docMk/>
-            <pc:sldMk cId="0" sldId="259"/>
-            <ac:spMk id="416" creationId="{00000000-0000-0000-0000-000000000000}"/>
-          </ac:spMkLst>
-        </pc:spChg>
-      </pc:sldChg>
-      <pc:sldChg chg="modNotesTx">
-        <pc:chgData name="elodiecslawinski@gmail.com" userId="2d9956b1ce3ed99c" providerId="LiveId" clId="{8DF0BD16-E9E4-47A1-AF8C-2DAF4C310ECB}" dt="2021-09-26T14:04:43.110" v="1851" actId="20577"/>
-        <pc:sldMkLst>
-          <pc:docMk/>
-          <pc:sldMk cId="0" sldId="260"/>
-        </pc:sldMkLst>
-      </pc:sldChg>
-      <pc:sldChg chg="del">
-        <pc:chgData name="elodiecslawinski@gmail.com" userId="2d9956b1ce3ed99c" providerId="LiveId" clId="{8DF0BD16-E9E4-47A1-AF8C-2DAF4C310ECB}" dt="2021-09-26T13:45:17.888" v="126" actId="47"/>
-        <pc:sldMkLst>
-          <pc:docMk/>
-          <pc:sldMk cId="0" sldId="261"/>
-        </pc:sldMkLst>
-      </pc:sldChg>
-      <pc:sldChg chg="modSp mod modNotesTx">
-        <pc:chgData name="elodiecslawinski@gmail.com" userId="2d9956b1ce3ed99c" providerId="LiveId" clId="{8DF0BD16-E9E4-47A1-AF8C-2DAF4C310ECB}" dt="2021-09-26T14:19:42.604" v="1989" actId="20577"/>
-        <pc:sldMkLst>
-          <pc:docMk/>
-          <pc:sldMk cId="0" sldId="262"/>
-        </pc:sldMkLst>
-        <pc:spChg chg="mod">
-          <ac:chgData name="elodiecslawinski@gmail.com" userId="2d9956b1ce3ed99c" providerId="LiveId" clId="{8DF0BD16-E9E4-47A1-AF8C-2DAF4C310ECB}" dt="2021-09-26T14:07:35.788" v="1901" actId="20577"/>
-          <ac:spMkLst>
-            <pc:docMk/>
-            <pc:sldMk cId="0" sldId="262"/>
-            <ac:spMk id="448" creationId="{00000000-0000-0000-0000-000000000000}"/>
-          </ac:spMkLst>
-        </pc:spChg>
-        <pc:spChg chg="mod">
-          <ac:chgData name="elodiecslawinski@gmail.com" userId="2d9956b1ce3ed99c" providerId="LiveId" clId="{8DF0BD16-E9E4-47A1-AF8C-2DAF4C310ECB}" dt="2021-09-26T14:06:31.430" v="1892" actId="20577"/>
-          <ac:spMkLst>
-            <pc:docMk/>
-            <pc:sldMk cId="0" sldId="262"/>
-            <ac:spMk id="449" creationId="{00000000-0000-0000-0000-000000000000}"/>
-          </ac:spMkLst>
-        </pc:spChg>
-      </pc:sldChg>
-      <pc:sldChg chg="modNotesTx">
-        <pc:chgData name="elodiecslawinski@gmail.com" userId="2d9956b1ce3ed99c" providerId="LiveId" clId="{8DF0BD16-E9E4-47A1-AF8C-2DAF4C310ECB}" dt="2021-09-26T14:20:59.117" v="2017" actId="20577"/>
-        <pc:sldMkLst>
-          <pc:docMk/>
-          <pc:sldMk cId="0" sldId="263"/>
-        </pc:sldMkLst>
-      </pc:sldChg>
-      <pc:sldChg chg="modNotesTx">
-        <pc:chgData name="elodiecslawinski@gmail.com" userId="2d9956b1ce3ed99c" providerId="LiveId" clId="{8DF0BD16-E9E4-47A1-AF8C-2DAF4C310ECB}" dt="2021-09-26T14:21:31.376" v="2040" actId="20577"/>
-        <pc:sldMkLst>
-          <pc:docMk/>
-          <pc:sldMk cId="0" sldId="264"/>
-        </pc:sldMkLst>
-      </pc:sldChg>
-      <pc:sldChg chg="modSp mod modNotesTx">
-        <pc:chgData name="elodiecslawinski@gmail.com" userId="2d9956b1ce3ed99c" providerId="LiveId" clId="{8DF0BD16-E9E4-47A1-AF8C-2DAF4C310ECB}" dt="2021-09-26T14:15:32.229" v="1922" actId="20577"/>
-        <pc:sldMkLst>
-          <pc:docMk/>
-          <pc:sldMk cId="0" sldId="265"/>
-        </pc:sldMkLst>
-        <pc:picChg chg="mod modCrop">
-          <ac:chgData name="elodiecslawinski@gmail.com" userId="2d9956b1ce3ed99c" providerId="LiveId" clId="{8DF0BD16-E9E4-47A1-AF8C-2DAF4C310ECB}" dt="2021-09-26T13:46:36.253" v="149" actId="1037"/>
-          <ac:picMkLst>
-            <pc:docMk/>
-            <pc:sldMk cId="0" sldId="265"/>
-            <ac:picMk id="476" creationId="{00000000-0000-0000-0000-000000000000}"/>
-          </ac:picMkLst>
-        </pc:picChg>
-      </pc:sldChg>
-      <pc:sldChg chg="modSp del mod">
-        <pc:chgData name="elodiecslawinski@gmail.com" userId="2d9956b1ce3ed99c" providerId="LiveId" clId="{8DF0BD16-E9E4-47A1-AF8C-2DAF4C310ECB}" dt="2021-09-26T13:49:21.920" v="279" actId="47"/>
-        <pc:sldMkLst>
-          <pc:docMk/>
-          <pc:sldMk cId="0" sldId="266"/>
-        </pc:sldMkLst>
-        <pc:spChg chg="mod">
-          <ac:chgData name="elodiecslawinski@gmail.com" userId="2d9956b1ce3ed99c" providerId="LiveId" clId="{8DF0BD16-E9E4-47A1-AF8C-2DAF4C310ECB}" dt="2021-09-26T13:47:54.842" v="268" actId="948"/>
-          <ac:spMkLst>
-            <pc:docMk/>
-            <pc:sldMk cId="0" sldId="266"/>
-            <ac:spMk id="484" creationId="{00000000-0000-0000-0000-000000000000}"/>
-          </ac:spMkLst>
-        </pc:spChg>
-        <pc:spChg chg="mod">
-          <ac:chgData name="elodiecslawinski@gmail.com" userId="2d9956b1ce3ed99c" providerId="LiveId" clId="{8DF0BD16-E9E4-47A1-AF8C-2DAF4C310ECB}" dt="2021-09-26T13:48:01.048" v="269" actId="948"/>
-          <ac:spMkLst>
-            <pc:docMk/>
-            <pc:sldMk cId="0" sldId="266"/>
-            <ac:spMk id="486" creationId="{00000000-0000-0000-0000-000000000000}"/>
-          </ac:spMkLst>
-        </pc:spChg>
-      </pc:sldChg>
-      <pc:sldChg chg="modSp mod ord modNotesTx">
-        <pc:chgData name="elodiecslawinski@gmail.com" userId="2d9956b1ce3ed99c" providerId="LiveId" clId="{8DF0BD16-E9E4-47A1-AF8C-2DAF4C310ECB}" dt="2021-09-26T14:14:51.684" v="1919"/>
-        <pc:sldMkLst>
-          <pc:docMk/>
-          <pc:sldMk cId="278083588" sldId="267"/>
-        </pc:sldMkLst>
-        <pc:spChg chg="mod">
-          <ac:chgData name="elodiecslawinski@gmail.com" userId="2d9956b1ce3ed99c" providerId="LiveId" clId="{8DF0BD16-E9E4-47A1-AF8C-2DAF4C310ECB}" dt="2021-09-26T14:10:55.502" v="1911" actId="20577"/>
-          <ac:spMkLst>
-            <pc:docMk/>
-            <pc:sldMk cId="278083588" sldId="267"/>
-            <ac:spMk id="16" creationId="{14C7CA51-417C-46E3-BA84-AA664C9C39A8}"/>
-          </ac:spMkLst>
-        </pc:spChg>
-      </pc:sldChg>
-      <pc:sldChg chg="modSp mod ord modNotesTx">
-        <pc:chgData name="elodiecslawinski@gmail.com" userId="2d9956b1ce3ed99c" providerId="LiveId" clId="{8DF0BD16-E9E4-47A1-AF8C-2DAF4C310ECB}" dt="2021-09-26T14:16:14.205" v="1926" actId="20577"/>
-        <pc:sldMkLst>
-          <pc:docMk/>
-          <pc:sldMk cId="1111481105" sldId="268"/>
-        </pc:sldMkLst>
-        <pc:spChg chg="mod">
-          <ac:chgData name="elodiecslawinski@gmail.com" userId="2d9956b1ce3ed99c" providerId="LiveId" clId="{8DF0BD16-E9E4-47A1-AF8C-2DAF4C310ECB}" dt="2021-09-26T14:16:14.205" v="1926" actId="20577"/>
-          <ac:spMkLst>
-            <pc:docMk/>
-            <pc:sldMk cId="1111481105" sldId="268"/>
-            <ac:spMk id="16" creationId="{14C7CA51-417C-46E3-BA84-AA664C9C39A8}"/>
-          </ac:spMkLst>
-        </pc:spChg>
-      </pc:sldChg>
-      <pc:sldChg chg="modNotesTx">
-        <pc:chgData name="elodiecslawinski@gmail.com" userId="2d9956b1ce3ed99c" providerId="LiveId" clId="{8DF0BD16-E9E4-47A1-AF8C-2DAF4C310ECB}" dt="2021-09-26T14:21:12.574" v="2019"/>
-        <pc:sldMkLst>
-          <pc:docMk/>
-          <pc:sldMk cId="3714457294" sldId="269"/>
-        </pc:sldMkLst>
-      </pc:sldChg>
-      <pc:sldChg chg="addSp delSp modSp add mod ord modNotesTx">
-        <pc:chgData name="elodiecslawinski@gmail.com" userId="2d9956b1ce3ed99c" providerId="LiveId" clId="{8DF0BD16-E9E4-47A1-AF8C-2DAF4C310ECB}" dt="2021-09-26T14:20:15.200" v="2005" actId="5793"/>
-        <pc:sldMkLst>
-          <pc:docMk/>
-          <pc:sldMk cId="1235496140" sldId="270"/>
-        </pc:sldMkLst>
-        <pc:spChg chg="add mod">
-          <ac:chgData name="elodiecslawinski@gmail.com" userId="2d9956b1ce3ed99c" providerId="LiveId" clId="{8DF0BD16-E9E4-47A1-AF8C-2DAF4C310ECB}" dt="2021-09-26T13:43:54.013" v="108" actId="1035"/>
-          <ac:spMkLst>
-            <pc:docMk/>
-            <pc:sldMk cId="1235496140" sldId="270"/>
-            <ac:spMk id="4" creationId="{A950B85F-69A5-4759-AEE3-89AABA8B9977}"/>
-          </ac:spMkLst>
-        </pc:spChg>
-        <pc:spChg chg="add del mod">
-          <ac:chgData name="elodiecslawinski@gmail.com" userId="2d9956b1ce3ed99c" providerId="LiveId" clId="{8DF0BD16-E9E4-47A1-AF8C-2DAF4C310ECB}" dt="2021-09-26T13:41:32.252" v="36" actId="478"/>
-          <ac:spMkLst>
-            <pc:docMk/>
-            <pc:sldMk cId="1235496140" sldId="270"/>
-            <ac:spMk id="5" creationId="{86E88417-E068-47E6-937B-CADD426AFD8A}"/>
-          </ac:spMkLst>
-        </pc:spChg>
-        <pc:spChg chg="del">
-          <ac:chgData name="elodiecslawinski@gmail.com" userId="2d9956b1ce3ed99c" providerId="LiveId" clId="{8DF0BD16-E9E4-47A1-AF8C-2DAF4C310ECB}" dt="2021-09-26T13:41:36.957" v="37" actId="478"/>
-          <ac:spMkLst>
-            <pc:docMk/>
-            <pc:sldMk cId="1235496140" sldId="270"/>
-            <ac:spMk id="407" creationId="{00000000-0000-0000-0000-000000000000}"/>
-          </ac:spMkLst>
-        </pc:spChg>
-        <pc:spChg chg="mod">
-          <ac:chgData name="elodiecslawinski@gmail.com" userId="2d9956b1ce3ed99c" providerId="LiveId" clId="{8DF0BD16-E9E4-47A1-AF8C-2DAF4C310ECB}" dt="2021-09-26T13:45:00.065" v="125" actId="27636"/>
-          <ac:spMkLst>
-            <pc:docMk/>
-            <pc:sldMk cId="1235496140" sldId="270"/>
-            <ac:spMk id="408" creationId="{00000000-0000-0000-0000-000000000000}"/>
-          </ac:spMkLst>
-        </pc:spChg>
-        <pc:cxnChg chg="add mod">
-          <ac:chgData name="elodiecslawinski@gmail.com" userId="2d9956b1ce3ed99c" providerId="LiveId" clId="{8DF0BD16-E9E4-47A1-AF8C-2DAF4C310ECB}" dt="2021-09-26T13:44:34.734" v="118" actId="14100"/>
-          <ac:cxnSpMkLst>
-            <pc:docMk/>
-            <pc:sldMk cId="1235496140" sldId="270"/>
-            <ac:cxnSpMk id="6" creationId="{DB6A10FD-9BE6-452F-A201-357351D1D7EC}"/>
-          </ac:cxnSpMkLst>
-        </pc:cxnChg>
-        <pc:cxnChg chg="add del mod">
-          <ac:chgData name="elodiecslawinski@gmail.com" userId="2d9956b1ce3ed99c" providerId="LiveId" clId="{8DF0BD16-E9E4-47A1-AF8C-2DAF4C310ECB}" dt="2021-09-26T13:42:13.460" v="48" actId="478"/>
-          <ac:cxnSpMkLst>
-            <pc:docMk/>
-            <pc:sldMk cId="1235496140" sldId="270"/>
-            <ac:cxnSpMk id="7" creationId="{D89C6238-BBBB-417E-9B23-27E1DE6EE69B}"/>
-          </ac:cxnSpMkLst>
-        </pc:cxnChg>
-        <pc:cxnChg chg="add del mod">
-          <ac:chgData name="elodiecslawinski@gmail.com" userId="2d9956b1ce3ed99c" providerId="LiveId" clId="{8DF0BD16-E9E4-47A1-AF8C-2DAF4C310ECB}" dt="2021-09-26T13:42:23.293" v="51" actId="478"/>
-          <ac:cxnSpMkLst>
-            <pc:docMk/>
-            <pc:sldMk cId="1235496140" sldId="270"/>
-            <ac:cxnSpMk id="8" creationId="{EF55CAFC-E3EA-4BC1-BE8B-17EE7D931F50}"/>
-          </ac:cxnSpMkLst>
-        </pc:cxnChg>
-        <pc:cxnChg chg="add del mod">
-          <ac:chgData name="elodiecslawinski@gmail.com" userId="2d9956b1ce3ed99c" providerId="LiveId" clId="{8DF0BD16-E9E4-47A1-AF8C-2DAF4C310ECB}" dt="2021-09-26T13:42:14.416" v="49" actId="478"/>
-          <ac:cxnSpMkLst>
-            <pc:docMk/>
-            <pc:sldMk cId="1235496140" sldId="270"/>
-            <ac:cxnSpMk id="9" creationId="{2E1BD003-632F-4CB8-BA47-25CC9BA391F0}"/>
-          </ac:cxnSpMkLst>
-        </pc:cxnChg>
-        <pc:cxnChg chg="add del mod">
-          <ac:chgData name="elodiecslawinski@gmail.com" userId="2d9956b1ce3ed99c" providerId="LiveId" clId="{8DF0BD16-E9E4-47A1-AF8C-2DAF4C310ECB}" dt="2021-09-26T13:42:23.293" v="51" actId="478"/>
-          <ac:cxnSpMkLst>
-            <pc:docMk/>
-            <pc:sldMk cId="1235496140" sldId="270"/>
-            <ac:cxnSpMk id="10" creationId="{51A63CCE-34A4-42BD-91CB-D42CCBF6C09C}"/>
-          </ac:cxnSpMkLst>
-        </pc:cxnChg>
-        <pc:cxnChg chg="add del mod">
-          <ac:chgData name="elodiecslawinski@gmail.com" userId="2d9956b1ce3ed99c" providerId="LiveId" clId="{8DF0BD16-E9E4-47A1-AF8C-2DAF4C310ECB}" dt="2021-09-26T13:42:14.958" v="50" actId="478"/>
-          <ac:cxnSpMkLst>
-            <pc:docMk/>
-            <pc:sldMk cId="1235496140" sldId="270"/>
-            <ac:cxnSpMk id="11" creationId="{B8EA7FD6-7744-4F95-A845-D8D2192771BF}"/>
-          </ac:cxnSpMkLst>
-        </pc:cxnChg>
-        <pc:cxnChg chg="add mod">
-          <ac:chgData name="elodiecslawinski@gmail.com" userId="2d9956b1ce3ed99c" providerId="LiveId" clId="{8DF0BD16-E9E4-47A1-AF8C-2DAF4C310ECB}" dt="2021-09-26T13:44:34.734" v="118" actId="14100"/>
-          <ac:cxnSpMkLst>
-            <pc:docMk/>
-            <pc:sldMk cId="1235496140" sldId="270"/>
-            <ac:cxnSpMk id="13" creationId="{203EDF05-E7A2-483C-9306-40A18AD61A94}"/>
-          </ac:cxnSpMkLst>
-        </pc:cxnChg>
-        <pc:cxnChg chg="add mod">
-          <ac:chgData name="elodiecslawinski@gmail.com" userId="2d9956b1ce3ed99c" providerId="LiveId" clId="{8DF0BD16-E9E4-47A1-AF8C-2DAF4C310ECB}" dt="2021-09-26T13:44:34.734" v="118" actId="14100"/>
-          <ac:cxnSpMkLst>
-            <pc:docMk/>
-            <pc:sldMk cId="1235496140" sldId="270"/>
-            <ac:cxnSpMk id="16" creationId="{1299F7D2-16E7-4D72-8355-667860C460DC}"/>
-          </ac:cxnSpMkLst>
-        </pc:cxnChg>
-        <pc:cxnChg chg="add mod">
-          <ac:chgData name="elodiecslawinski@gmail.com" userId="2d9956b1ce3ed99c" providerId="LiveId" clId="{8DF0BD16-E9E4-47A1-AF8C-2DAF4C310ECB}" dt="2021-09-26T13:44:34.734" v="118" actId="14100"/>
-          <ac:cxnSpMkLst>
-            <pc:docMk/>
-            <pc:sldMk cId="1235496140" sldId="270"/>
-            <ac:cxnSpMk id="17" creationId="{71C7E9C2-F3B6-4BED-9EA4-A589A8ED4C8F}"/>
-          </ac:cxnSpMkLst>
-        </pc:cxnChg>
-        <pc:cxnChg chg="add mod">
-          <ac:chgData name="elodiecslawinski@gmail.com" userId="2d9956b1ce3ed99c" providerId="LiveId" clId="{8DF0BD16-E9E4-47A1-AF8C-2DAF4C310ECB}" dt="2021-09-26T13:44:34.734" v="118" actId="14100"/>
-          <ac:cxnSpMkLst>
-            <pc:docMk/>
-            <pc:sldMk cId="1235496140" sldId="270"/>
-            <ac:cxnSpMk id="18" creationId="{8879D355-E064-4588-A189-127E6CADD0C8}"/>
-          </ac:cxnSpMkLst>
-        </pc:cxnChg>
-        <pc:cxnChg chg="add mod">
-          <ac:chgData name="elodiecslawinski@gmail.com" userId="2d9956b1ce3ed99c" providerId="LiveId" clId="{8DF0BD16-E9E4-47A1-AF8C-2DAF4C310ECB}" dt="2021-09-26T13:44:34.734" v="118" actId="14100"/>
-          <ac:cxnSpMkLst>
-            <pc:docMk/>
-            <pc:sldMk cId="1235496140" sldId="270"/>
-            <ac:cxnSpMk id="19" creationId="{7D0671E2-144C-4954-864C-D83B9206DA42}"/>
-          </ac:cxnSpMkLst>
-        </pc:cxnChg>
-        <pc:cxnChg chg="add mod">
-          <ac:chgData name="elodiecslawinski@gmail.com" userId="2d9956b1ce3ed99c" providerId="LiveId" clId="{8DF0BD16-E9E4-47A1-AF8C-2DAF4C310ECB}" dt="2021-09-26T13:44:34.734" v="118" actId="14100"/>
-          <ac:cxnSpMkLst>
-            <pc:docMk/>
-            <pc:sldMk cId="1235496140" sldId="270"/>
-            <ac:cxnSpMk id="20" creationId="{DE769DAB-5375-4072-AF13-EA14627334C9}"/>
-          </ac:cxnSpMkLst>
-        </pc:cxnChg>
-        <pc:cxnChg chg="add mod">
-          <ac:chgData name="elodiecslawinski@gmail.com" userId="2d9956b1ce3ed99c" providerId="LiveId" clId="{8DF0BD16-E9E4-47A1-AF8C-2DAF4C310ECB}" dt="2021-09-26T13:44:34.734" v="118" actId="14100"/>
-          <ac:cxnSpMkLst>
-            <pc:docMk/>
-            <pc:sldMk cId="1235496140" sldId="270"/>
-            <ac:cxnSpMk id="21" creationId="{1B18CE07-B0F7-49D8-80E8-839B4A81D1D5}"/>
-          </ac:cxnSpMkLst>
-        </pc:cxnChg>
-      </pc:sldChg>
-      <pc:sldChg chg="delSp modSp add mod modNotesTx">
-        <pc:chgData name="elodiecslawinski@gmail.com" userId="2d9956b1ce3ed99c" providerId="LiveId" clId="{8DF0BD16-E9E4-47A1-AF8C-2DAF4C310ECB}" dt="2021-09-26T14:15:37.441" v="1925"/>
-        <pc:sldMkLst>
-          <pc:docMk/>
-          <pc:sldMk cId="603075993" sldId="271"/>
-        </pc:sldMkLst>
-        <pc:spChg chg="mod">
-          <ac:chgData name="elodiecslawinski@gmail.com" userId="2d9956b1ce3ed99c" providerId="LiveId" clId="{8DF0BD16-E9E4-47A1-AF8C-2DAF4C310ECB}" dt="2021-09-26T13:46:48.914" v="156" actId="20577"/>
-          <ac:spMkLst>
-            <pc:docMk/>
-            <pc:sldMk cId="603075993" sldId="271"/>
-            <ac:spMk id="6" creationId="{2EDF94B8-ABF5-4274-82C1-0B6DCC914898}"/>
-          </ac:spMkLst>
-        </pc:spChg>
-        <pc:spChg chg="mod">
-          <ac:chgData name="elodiecslawinski@gmail.com" userId="2d9956b1ce3ed99c" providerId="LiveId" clId="{8DF0BD16-E9E4-47A1-AF8C-2DAF4C310ECB}" dt="2021-09-26T13:46:56.126" v="165" actId="20577"/>
-          <ac:spMkLst>
-            <pc:docMk/>
-            <pc:sldMk cId="603075993" sldId="271"/>
-            <ac:spMk id="473" creationId="{00000000-0000-0000-0000-000000000000}"/>
-          </ac:spMkLst>
-        </pc:spChg>
-        <pc:picChg chg="del">
-          <ac:chgData name="elodiecslawinski@gmail.com" userId="2d9956b1ce3ed99c" providerId="LiveId" clId="{8DF0BD16-E9E4-47A1-AF8C-2DAF4C310ECB}" dt="2021-09-26T13:46:58.076" v="166" actId="478"/>
-          <ac:picMkLst>
-            <pc:docMk/>
-            <pc:sldMk cId="603075993" sldId="271"/>
-            <ac:picMk id="476" creationId="{00000000-0000-0000-0000-000000000000}"/>
-          </ac:picMkLst>
-        </pc:picChg>
-      </pc:sldChg>
-      <pc:sldChg chg="addSp delSp modSp add mod modNotesTx">
-        <pc:chgData name="elodiecslawinski@gmail.com" userId="2d9956b1ce3ed99c" providerId="LiveId" clId="{8DF0BD16-E9E4-47A1-AF8C-2DAF4C310ECB}" dt="2021-09-26T13:54:16.185" v="399"/>
-        <pc:sldMkLst>
-          <pc:docMk/>
-          <pc:sldMk cId="1768522250" sldId="272"/>
-        </pc:sldMkLst>
-        <pc:spChg chg="add del mod">
-          <ac:chgData name="elodiecslawinski@gmail.com" userId="2d9956b1ce3ed99c" providerId="LiveId" clId="{8DF0BD16-E9E4-47A1-AF8C-2DAF4C310ECB}" dt="2021-09-26T13:48:54.220" v="272" actId="478"/>
-          <ac:spMkLst>
-            <pc:docMk/>
-            <pc:sldMk cId="1768522250" sldId="272"/>
-            <ac:spMk id="3" creationId="{25FB4F3A-6AE6-4F73-998A-AC8CE1B68D62}"/>
-          </ac:spMkLst>
-        </pc:spChg>
-        <pc:spChg chg="del">
-          <ac:chgData name="elodiecslawinski@gmail.com" userId="2d9956b1ce3ed99c" providerId="LiveId" clId="{8DF0BD16-E9E4-47A1-AF8C-2DAF4C310ECB}" dt="2021-09-26T13:48:52.314" v="271" actId="478"/>
-          <ac:spMkLst>
-            <pc:docMk/>
-            <pc:sldMk cId="1768522250" sldId="272"/>
-            <ac:spMk id="6" creationId="{2EDF94B8-ABF5-4274-82C1-0B6DCC914898}"/>
-          </ac:spMkLst>
-        </pc:spChg>
-        <pc:spChg chg="del">
-          <ac:chgData name="elodiecslawinski@gmail.com" userId="2d9956b1ce3ed99c" providerId="LiveId" clId="{8DF0BD16-E9E4-47A1-AF8C-2DAF4C310ECB}" dt="2021-09-26T13:48:52.314" v="271" actId="478"/>
-          <ac:spMkLst>
-            <pc:docMk/>
-            <pc:sldMk cId="1768522250" sldId="272"/>
-            <ac:spMk id="7" creationId="{D4D543A3-468C-46CA-85FE-9F9207012952}"/>
-          </ac:spMkLst>
-        </pc:spChg>
-        <pc:spChg chg="add mod">
-          <ac:chgData name="elodiecslawinski@gmail.com" userId="2d9956b1ce3ed99c" providerId="LiveId" clId="{8DF0BD16-E9E4-47A1-AF8C-2DAF4C310ECB}" dt="2021-09-26T13:51:28.437" v="334" actId="404"/>
-          <ac:spMkLst>
-            <pc:docMk/>
-            <pc:sldMk cId="1768522250" sldId="272"/>
-            <ac:spMk id="8" creationId="{6D2D196F-F6A8-4270-8E4D-BC531CA6CD68}"/>
-          </ac:spMkLst>
-        </pc:spChg>
-        <pc:spChg chg="add mod">
-          <ac:chgData name="elodiecslawinski@gmail.com" userId="2d9956b1ce3ed99c" providerId="LiveId" clId="{8DF0BD16-E9E4-47A1-AF8C-2DAF4C310ECB}" dt="2021-09-26T13:49:00.637" v="275" actId="14100"/>
-          <ac:spMkLst>
-            <pc:docMk/>
-            <pc:sldMk cId="1768522250" sldId="272"/>
-            <ac:spMk id="10" creationId="{B06E7D1A-876A-4ED3-9647-DB348569DAA2}"/>
-          </ac:spMkLst>
-        </pc:spChg>
-        <pc:spChg chg="add mod">
-          <ac:chgData name="elodiecslawinski@gmail.com" userId="2d9956b1ce3ed99c" providerId="LiveId" clId="{8DF0BD16-E9E4-47A1-AF8C-2DAF4C310ECB}" dt="2021-09-26T13:49:00.637" v="275" actId="14100"/>
-          <ac:spMkLst>
-            <pc:docMk/>
-            <pc:sldMk cId="1768522250" sldId="272"/>
-            <ac:spMk id="11" creationId="{57EA30B1-B344-4069-AAE2-4FA2167206C3}"/>
-          </ac:spMkLst>
-        </pc:spChg>
-        <pc:spChg chg="add mod">
-          <ac:chgData name="elodiecslawinski@gmail.com" userId="2d9956b1ce3ed99c" providerId="LiveId" clId="{8DF0BD16-E9E4-47A1-AF8C-2DAF4C310ECB}" dt="2021-09-26T13:49:05.428" v="276"/>
-          <ac:spMkLst>
-            <pc:docMk/>
-            <pc:sldMk cId="1768522250" sldId="272"/>
-            <ac:spMk id="14" creationId="{BA5A1AD3-05D0-463E-9634-4F7BC59CD4BC}"/>
-          </ac:spMkLst>
-        </pc:spChg>
-        <pc:spChg chg="add mod">
-          <ac:chgData name="elodiecslawinski@gmail.com" userId="2d9956b1ce3ed99c" providerId="LiveId" clId="{8DF0BD16-E9E4-47A1-AF8C-2DAF4C310ECB}" dt="2021-09-26T13:49:05.428" v="276"/>
-          <ac:spMkLst>
-            <pc:docMk/>
-            <pc:sldMk cId="1768522250" sldId="272"/>
-            <ac:spMk id="15" creationId="{6C629E07-987C-4CD8-AE1B-DCF21A791680}"/>
-          </ac:spMkLst>
-        </pc:spChg>
-        <pc:spChg chg="del">
-          <ac:chgData name="elodiecslawinski@gmail.com" userId="2d9956b1ce3ed99c" providerId="LiveId" clId="{8DF0BD16-E9E4-47A1-AF8C-2DAF4C310ECB}" dt="2021-09-26T13:48:52.314" v="271" actId="478"/>
-          <ac:spMkLst>
-            <pc:docMk/>
-            <pc:sldMk cId="1768522250" sldId="272"/>
-            <ac:spMk id="473" creationId="{00000000-0000-0000-0000-000000000000}"/>
-          </ac:spMkLst>
-        </pc:spChg>
-        <pc:picChg chg="add mod">
-          <ac:chgData name="elodiecslawinski@gmail.com" userId="2d9956b1ce3ed99c" providerId="LiveId" clId="{8DF0BD16-E9E4-47A1-AF8C-2DAF4C310ECB}" dt="2021-09-26T13:48:54.835" v="273"/>
-          <ac:picMkLst>
-            <pc:docMk/>
-            <pc:sldMk cId="1768522250" sldId="272"/>
-            <ac:picMk id="9" creationId="{AC5BEC3B-4EBE-494F-9373-F994A1FF35C2}"/>
-          </ac:picMkLst>
-        </pc:picChg>
-        <pc:picChg chg="add mod">
-          <ac:chgData name="elodiecslawinski@gmail.com" userId="2d9956b1ce3ed99c" providerId="LiveId" clId="{8DF0BD16-E9E4-47A1-AF8C-2DAF4C310ECB}" dt="2021-09-26T13:48:54.835" v="273"/>
-          <ac:picMkLst>
-            <pc:docMk/>
-            <pc:sldMk cId="1768522250" sldId="272"/>
-            <ac:picMk id="12" creationId="{6D10FEAE-28FF-4F78-84E2-6D2A63096EB5}"/>
-          </ac:picMkLst>
-        </pc:picChg>
-        <pc:picChg chg="add mod">
-          <ac:chgData name="elodiecslawinski@gmail.com" userId="2d9956b1ce3ed99c" providerId="LiveId" clId="{8DF0BD16-E9E4-47A1-AF8C-2DAF4C310ECB}" dt="2021-09-26T13:48:54.835" v="273"/>
-          <ac:picMkLst>
-            <pc:docMk/>
-            <pc:sldMk cId="1768522250" sldId="272"/>
-            <ac:picMk id="13" creationId="{5AB06107-2D57-4983-9D94-64514A900551}"/>
-          </ac:picMkLst>
-        </pc:picChg>
-      </pc:sldChg>
-      <pc:sldMasterChg chg="delSldLayout">
-        <pc:chgData name="elodiecslawinski@gmail.com" userId="2d9956b1ce3ed99c" providerId="LiveId" clId="{8DF0BD16-E9E4-47A1-AF8C-2DAF4C310ECB}" dt="2021-09-26T13:49:21.920" v="279" actId="47"/>
-        <pc:sldMasterMkLst>
-          <pc:docMk/>
-          <pc:sldMasterMk cId="0" sldId="2147483712"/>
-        </pc:sldMasterMkLst>
-        <pc:sldLayoutChg chg="del">
-          <pc:chgData name="elodiecslawinski@gmail.com" userId="2d9956b1ce3ed99c" providerId="LiveId" clId="{8DF0BD16-E9E4-47A1-AF8C-2DAF4C310ECB}" dt="2021-09-26T13:49:21.920" v="279" actId="47"/>
-          <pc:sldLayoutMkLst>
-            <pc:docMk/>
-            <pc:sldMasterMk cId="0" sldId="2147483712"/>
-            <pc:sldLayoutMk cId="0" sldId="2147483666"/>
-          </pc:sldLayoutMkLst>
-        </pc:sldLayoutChg>
-        <pc:sldLayoutChg chg="del">
-          <pc:chgData name="elodiecslawinski@gmail.com" userId="2d9956b1ce3ed99c" providerId="LiveId" clId="{8DF0BD16-E9E4-47A1-AF8C-2DAF4C310ECB}" dt="2021-09-26T13:45:17.888" v="126" actId="47"/>
-          <pc:sldLayoutMkLst>
-            <pc:docMk/>
-            <pc:sldMasterMk cId="0" sldId="2147483712"/>
-            <pc:sldLayoutMk cId="0" sldId="2147483671"/>
-          </pc:sldLayoutMkLst>
-        </pc:sldLayoutChg>
-      </pc:sldMasterChg>
-    </pc:docChg>
-  </pc:docChgLst>
-  <pc:docChgLst>
-    <pc:chgData name="elodiecslawinski@gmail.com" userId="2d9956b1ce3ed99c" providerId="LiveId" clId="{79719C05-BB10-4FCC-B2CE-0EC3DC887679}"/>
-    <pc:docChg chg="undo redo custSel addSld delSld modSld">
-      <pc:chgData name="elodiecslawinski@gmail.com" userId="2d9956b1ce3ed99c" providerId="LiveId" clId="{79719C05-BB10-4FCC-B2CE-0EC3DC887679}" dt="2021-09-25T15:12:34.635" v="1057" actId="1037"/>
-      <pc:docMkLst>
-        <pc:docMk/>
-      </pc:docMkLst>
-      <pc:sldChg chg="modSp mod modNotesTx">
-        <pc:chgData name="elodiecslawinski@gmail.com" userId="2d9956b1ce3ed99c" providerId="LiveId" clId="{79719C05-BB10-4FCC-B2CE-0EC3DC887679}" dt="2021-09-24T08:52:05.385" v="44" actId="255"/>
-        <pc:sldMkLst>
-          <pc:docMk/>
-          <pc:sldMk cId="0" sldId="257"/>
-        </pc:sldMkLst>
-        <pc:spChg chg="mod">
-          <ac:chgData name="elodiecslawinski@gmail.com" userId="2d9956b1ce3ed99c" providerId="LiveId" clId="{79719C05-BB10-4FCC-B2CE-0EC3DC887679}" dt="2021-09-24T08:52:05.385" v="44" actId="255"/>
-          <ac:spMkLst>
-            <pc:docMk/>
-            <pc:sldMk cId="0" sldId="257"/>
-            <ac:spMk id="393" creationId="{00000000-0000-0000-0000-000000000000}"/>
-          </ac:spMkLst>
-        </pc:spChg>
-      </pc:sldChg>
-      <pc:sldChg chg="modSp mod">
-        <pc:chgData name="elodiecslawinski@gmail.com" userId="2d9956b1ce3ed99c" providerId="LiveId" clId="{79719C05-BB10-4FCC-B2CE-0EC3DC887679}" dt="2021-09-24T08:53:46.106" v="92" actId="27636"/>
-        <pc:sldMkLst>
-          <pc:docMk/>
-          <pc:sldMk cId="0" sldId="261"/>
-        </pc:sldMkLst>
-        <pc:spChg chg="mod">
-          <ac:chgData name="elodiecslawinski@gmail.com" userId="2d9956b1ce3ed99c" providerId="LiveId" clId="{79719C05-BB10-4FCC-B2CE-0EC3DC887679}" dt="2021-09-24T08:53:46.106" v="92" actId="27636"/>
-          <ac:spMkLst>
-            <pc:docMk/>
-            <pc:sldMk cId="0" sldId="261"/>
-            <ac:spMk id="433" creationId="{00000000-0000-0000-0000-000000000000}"/>
-          </ac:spMkLst>
-        </pc:spChg>
-      </pc:sldChg>
-      <pc:sldChg chg="addSp delSp modSp mod">
-        <pc:chgData name="elodiecslawinski@gmail.com" userId="2d9956b1ce3ed99c" providerId="LiveId" clId="{79719C05-BB10-4FCC-B2CE-0EC3DC887679}" dt="2021-09-25T15:12:34.635" v="1057" actId="1037"/>
-        <pc:sldMkLst>
-          <pc:docMk/>
-          <pc:sldMk cId="0" sldId="264"/>
-        </pc:sldMkLst>
-        <pc:spChg chg="add mod">
-          <ac:chgData name="elodiecslawinski@gmail.com" userId="2d9956b1ce3ed99c" providerId="LiveId" clId="{79719C05-BB10-4FCC-B2CE-0EC3DC887679}" dt="2021-09-25T15:03:03.544" v="258" actId="20577"/>
-          <ac:spMkLst>
-            <pc:docMk/>
-            <pc:sldMk cId="0" sldId="264"/>
-            <ac:spMk id="2" creationId="{652A84E4-554A-4088-BEE6-1A777E8D4EA5}"/>
-          </ac:spMkLst>
-        </pc:spChg>
-        <pc:spChg chg="mod">
-          <ac:chgData name="elodiecslawinski@gmail.com" userId="2d9956b1ce3ed99c" providerId="LiveId" clId="{79719C05-BB10-4FCC-B2CE-0EC3DC887679}" dt="2021-09-25T15:10:59.969" v="884" actId="20577"/>
-          <ac:spMkLst>
-            <pc:docMk/>
-            <pc:sldMk cId="0" sldId="264"/>
-            <ac:spMk id="464" creationId="{00000000-0000-0000-0000-000000000000}"/>
-          </ac:spMkLst>
-        </pc:spChg>
-        <pc:spChg chg="mod">
-          <ac:chgData name="elodiecslawinski@gmail.com" userId="2d9956b1ce3ed99c" providerId="LiveId" clId="{79719C05-BB10-4FCC-B2CE-0EC3DC887679}" dt="2021-09-25T15:11:55.519" v="1025" actId="404"/>
-          <ac:spMkLst>
-            <pc:docMk/>
-            <pc:sldMk cId="0" sldId="264"/>
-            <ac:spMk id="465" creationId="{00000000-0000-0000-0000-000000000000}"/>
-          </ac:spMkLst>
-        </pc:spChg>
-        <pc:spChg chg="mod">
-          <ac:chgData name="elodiecslawinski@gmail.com" userId="2d9956b1ce3ed99c" providerId="LiveId" clId="{79719C05-BB10-4FCC-B2CE-0EC3DC887679}" dt="2021-09-25T15:05:38.163" v="345" actId="1038"/>
-          <ac:spMkLst>
-            <pc:docMk/>
-            <pc:sldMk cId="0" sldId="264"/>
-            <ac:spMk id="466" creationId="{00000000-0000-0000-0000-000000000000}"/>
-          </ac:spMkLst>
-        </pc:spChg>
-        <pc:picChg chg="add del mod">
-          <ac:chgData name="elodiecslawinski@gmail.com" userId="2d9956b1ce3ed99c" providerId="LiveId" clId="{79719C05-BB10-4FCC-B2CE-0EC3DC887679}" dt="2021-09-25T15:12:05.050" v="1026" actId="478"/>
-          <ac:picMkLst>
-            <pc:docMk/>
-            <pc:sldMk cId="0" sldId="264"/>
-            <ac:picMk id="4" creationId="{B29FA1EC-E4F3-4546-B034-BC2CAFC5F270}"/>
-          </ac:picMkLst>
-        </pc:picChg>
-        <pc:picChg chg="add mod">
-          <ac:chgData name="elodiecslawinski@gmail.com" userId="2d9956b1ce3ed99c" providerId="LiveId" clId="{79719C05-BB10-4FCC-B2CE-0EC3DC887679}" dt="2021-09-25T15:12:34.635" v="1057" actId="1037"/>
-          <ac:picMkLst>
-            <pc:docMk/>
-            <pc:sldMk cId="0" sldId="264"/>
-            <ac:picMk id="6" creationId="{0E4E9D4A-B67D-48C4-B79D-BE2B6474CD46}"/>
-          </ac:picMkLst>
-        </pc:picChg>
-        <pc:picChg chg="del">
-          <ac:chgData name="elodiecslawinski@gmail.com" userId="2d9956b1ce3ed99c" providerId="LiveId" clId="{79719C05-BB10-4FCC-B2CE-0EC3DC887679}" dt="2021-09-25T15:03:06.966" v="259" actId="478"/>
-          <ac:picMkLst>
-            <pc:docMk/>
-            <pc:sldMk cId="0" sldId="264"/>
-            <ac:picMk id="467" creationId="{00000000-0000-0000-0000-000000000000}"/>
-          </ac:picMkLst>
-        </pc:picChg>
-      </pc:sldChg>
-      <pc:sldChg chg="addSp delSp modSp mod modNotesTx">
-        <pc:chgData name="elodiecslawinski@gmail.com" userId="2d9956b1ce3ed99c" providerId="LiveId" clId="{79719C05-BB10-4FCC-B2CE-0EC3DC887679}" dt="2021-09-24T08:55:00.892" v="185" actId="20577"/>
-        <pc:sldMkLst>
-          <pc:docMk/>
-          <pc:sldMk cId="0" sldId="265"/>
-        </pc:sldMkLst>
-        <pc:spChg chg="add del mod">
-          <ac:chgData name="elodiecslawinski@gmail.com" userId="2d9956b1ce3ed99c" providerId="LiveId" clId="{79719C05-BB10-4FCC-B2CE-0EC3DC887679}" dt="2021-09-24T08:54:39.703" v="137" actId="478"/>
-          <ac:spMkLst>
-            <pc:docMk/>
-            <pc:sldMk cId="0" sldId="265"/>
-            <ac:spMk id="3" creationId="{48319640-6E0B-41FA-A4F4-1261400F9534}"/>
-          </ac:spMkLst>
-        </pc:spChg>
-        <pc:spChg chg="add del mod">
-          <ac:chgData name="elodiecslawinski@gmail.com" userId="2d9956b1ce3ed99c" providerId="LiveId" clId="{79719C05-BB10-4FCC-B2CE-0EC3DC887679}" dt="2021-09-24T08:54:45.180" v="138" actId="478"/>
-          <ac:spMkLst>
-            <pc:docMk/>
-            <pc:sldMk cId="0" sldId="265"/>
-            <ac:spMk id="5" creationId="{D3B93C67-42F2-451B-B88C-854E09254BB5}"/>
-          </ac:spMkLst>
-        </pc:spChg>
-        <pc:spChg chg="add mod">
-          <ac:chgData name="elodiecslawinski@gmail.com" userId="2d9956b1ce3ed99c" providerId="LiveId" clId="{79719C05-BB10-4FCC-B2CE-0EC3DC887679}" dt="2021-09-24T08:54:51.029" v="141" actId="6549"/>
-          <ac:spMkLst>
-            <pc:docMk/>
-            <pc:sldMk cId="0" sldId="265"/>
-            <ac:spMk id="6" creationId="{2EDF94B8-ABF5-4274-82C1-0B6DCC914898}"/>
-          </ac:spMkLst>
-        </pc:spChg>
-        <pc:spChg chg="add mod">
-          <ac:chgData name="elodiecslawinski@gmail.com" userId="2d9956b1ce3ed99c" providerId="LiveId" clId="{79719C05-BB10-4FCC-B2CE-0EC3DC887679}" dt="2021-09-24T08:53:53.772" v="119" actId="20577"/>
-          <ac:spMkLst>
-            <pc:docMk/>
-            <pc:sldMk cId="0" sldId="265"/>
-            <ac:spMk id="7" creationId="{D4D543A3-468C-46CA-85FE-9F9207012952}"/>
-          </ac:spMkLst>
-        </pc:spChg>
-        <pc:spChg chg="mod">
-          <ac:chgData name="elodiecslawinski@gmail.com" userId="2d9956b1ce3ed99c" providerId="LiveId" clId="{79719C05-BB10-4FCC-B2CE-0EC3DC887679}" dt="2021-09-24T08:53:33.787" v="87" actId="255"/>
-          <ac:spMkLst>
-            <pc:docMk/>
-            <pc:sldMk cId="0" sldId="265"/>
-            <ac:spMk id="473" creationId="{00000000-0000-0000-0000-000000000000}"/>
-          </ac:spMkLst>
-        </pc:spChg>
-        <pc:spChg chg="del mod">
-          <ac:chgData name="elodiecslawinski@gmail.com" userId="2d9956b1ce3ed99c" providerId="LiveId" clId="{79719C05-BB10-4FCC-B2CE-0EC3DC887679}" dt="2021-09-24T08:54:23.676" v="131" actId="478"/>
-          <ac:spMkLst>
-            <pc:docMk/>
-            <pc:sldMk cId="0" sldId="265"/>
-            <ac:spMk id="474" creationId="{00000000-0000-0000-0000-000000000000}"/>
-          </ac:spMkLst>
-        </pc:spChg>
-        <pc:spChg chg="del mod">
-          <ac:chgData name="elodiecslawinski@gmail.com" userId="2d9956b1ce3ed99c" providerId="LiveId" clId="{79719C05-BB10-4FCC-B2CE-0EC3DC887679}" dt="2021-09-24T08:54:06.907" v="125" actId="478"/>
-          <ac:spMkLst>
-            <pc:docMk/>
-            <pc:sldMk cId="0" sldId="265"/>
-            <ac:spMk id="475" creationId="{00000000-0000-0000-0000-000000000000}"/>
-          </ac:spMkLst>
-        </pc:spChg>
-      </pc:sldChg>
-      <pc:sldChg chg="modSp mod">
-        <pc:chgData name="elodiecslawinski@gmail.com" userId="2d9956b1ce3ed99c" providerId="LiveId" clId="{79719C05-BB10-4FCC-B2CE-0EC3DC887679}" dt="2021-09-25T13:34:57.207" v="188" actId="404"/>
-        <pc:sldMkLst>
-          <pc:docMk/>
-          <pc:sldMk cId="0" sldId="266"/>
-        </pc:sldMkLst>
-        <pc:spChg chg="mod">
-          <ac:chgData name="elodiecslawinski@gmail.com" userId="2d9956b1ce3ed99c" providerId="LiveId" clId="{79719C05-BB10-4FCC-B2CE-0EC3DC887679}" dt="2021-09-25T13:34:57.207" v="188" actId="404"/>
-          <ac:spMkLst>
-            <pc:docMk/>
-            <pc:sldMk cId="0" sldId="266"/>
-            <ac:spMk id="482" creationId="{00000000-0000-0000-0000-000000000000}"/>
-          </ac:spMkLst>
-        </pc:spChg>
-      </pc:sldChg>
-      <pc:sldChg chg="addSp delSp modSp add mod">
-        <pc:chgData name="elodiecslawinski@gmail.com" userId="2d9956b1ce3ed99c" providerId="LiveId" clId="{79719C05-BB10-4FCC-B2CE-0EC3DC887679}" dt="2021-09-25T15:09:57.158" v="838" actId="948"/>
-        <pc:sldMkLst>
-          <pc:docMk/>
-          <pc:sldMk cId="278083588" sldId="267"/>
-        </pc:sldMkLst>
-        <pc:spChg chg="add del mod">
-          <ac:chgData name="elodiecslawinski@gmail.com" userId="2d9956b1ce3ed99c" providerId="LiveId" clId="{79719C05-BB10-4FCC-B2CE-0EC3DC887679}" dt="2021-09-25T15:05:48.229" v="348" actId="478"/>
-          <ac:spMkLst>
-            <pc:docMk/>
-            <pc:sldMk cId="278083588" sldId="267"/>
-            <ac:spMk id="7" creationId="{FA95AC9F-749C-4495-93F1-BEFA77B11FE0}"/>
-          </ac:spMkLst>
-        </pc:spChg>
-        <pc:spChg chg="add del mod">
-          <ac:chgData name="elodiecslawinski@gmail.com" userId="2d9956b1ce3ed99c" providerId="LiveId" clId="{79719C05-BB10-4FCC-B2CE-0EC3DC887679}" dt="2021-09-25T15:05:48.229" v="348" actId="478"/>
-          <ac:spMkLst>
-            <pc:docMk/>
-            <pc:sldMk cId="278083588" sldId="267"/>
-            <ac:spMk id="9" creationId="{94965EF6-3755-44DB-BBCF-89A46FBB41BA}"/>
-          </ac:spMkLst>
-        </pc:spChg>
-        <pc:spChg chg="add del mod">
-          <ac:chgData name="elodiecslawinski@gmail.com" userId="2d9956b1ce3ed99c" providerId="LiveId" clId="{79719C05-BB10-4FCC-B2CE-0EC3DC887679}" dt="2021-09-25T15:05:48.229" v="348" actId="478"/>
-          <ac:spMkLst>
-            <pc:docMk/>
-            <pc:sldMk cId="278083588" sldId="267"/>
-            <ac:spMk id="11" creationId="{BF058A83-0E53-4EEF-A46C-1E0AD84B3EC7}"/>
-          </ac:spMkLst>
-        </pc:spChg>
-        <pc:spChg chg="add mod">
-          <ac:chgData name="elodiecslawinski@gmail.com" userId="2d9956b1ce3ed99c" providerId="LiveId" clId="{79719C05-BB10-4FCC-B2CE-0EC3DC887679}" dt="2021-09-25T15:06:06.385" v="385" actId="27636"/>
-          <ac:spMkLst>
-            <pc:docMk/>
-            <pc:sldMk cId="278083588" sldId="267"/>
-            <ac:spMk id="15" creationId="{D77A808B-59FF-4693-9381-96D6E713FB7D}"/>
-          </ac:spMkLst>
-        </pc:spChg>
-        <pc:spChg chg="add mod">
-          <ac:chgData name="elodiecslawinski@gmail.com" userId="2d9956b1ce3ed99c" providerId="LiveId" clId="{79719C05-BB10-4FCC-B2CE-0EC3DC887679}" dt="2021-09-25T15:09:57.158" v="838" actId="948"/>
-          <ac:spMkLst>
-            <pc:docMk/>
-            <pc:sldMk cId="278083588" sldId="267"/>
-            <ac:spMk id="16" creationId="{14C7CA51-417C-46E3-BA84-AA664C9C39A8}"/>
-          </ac:spMkLst>
-        </pc:spChg>
-        <pc:spChg chg="add mod">
-          <ac:chgData name="elodiecslawinski@gmail.com" userId="2d9956b1ce3ed99c" providerId="LiveId" clId="{79719C05-BB10-4FCC-B2CE-0EC3DC887679}" dt="2021-09-25T15:05:48.707" v="349"/>
-          <ac:spMkLst>
-            <pc:docMk/>
-            <pc:sldMk cId="278083588" sldId="267"/>
-            <ac:spMk id="17" creationId="{ADBDCC2D-1F92-4943-B2A1-CAF50E8D6117}"/>
-          </ac:spMkLst>
-        </pc:spChg>
-        <pc:spChg chg="del mod">
-          <ac:chgData name="elodiecslawinski@gmail.com" userId="2d9956b1ce3ed99c" providerId="LiveId" clId="{79719C05-BB10-4FCC-B2CE-0EC3DC887679}" dt="2021-09-25T15:05:45.409" v="346" actId="478"/>
-          <ac:spMkLst>
-            <pc:docMk/>
-            <pc:sldMk cId="278083588" sldId="267"/>
-            <ac:spMk id="464" creationId="{00000000-0000-0000-0000-000000000000}"/>
-          </ac:spMkLst>
-        </pc:spChg>
-        <pc:spChg chg="del">
-          <ac:chgData name="elodiecslawinski@gmail.com" userId="2d9956b1ce3ed99c" providerId="LiveId" clId="{79719C05-BB10-4FCC-B2CE-0EC3DC887679}" dt="2021-09-25T15:05:45.409" v="346" actId="478"/>
-          <ac:spMkLst>
-            <pc:docMk/>
-            <pc:sldMk cId="278083588" sldId="267"/>
-            <ac:spMk id="465" creationId="{00000000-0000-0000-0000-000000000000}"/>
-          </ac:spMkLst>
-        </pc:spChg>
-        <pc:spChg chg="del">
-          <ac:chgData name="elodiecslawinski@gmail.com" userId="2d9956b1ce3ed99c" providerId="LiveId" clId="{79719C05-BB10-4FCC-B2CE-0EC3DC887679}" dt="2021-09-25T15:05:45.409" v="346" actId="478"/>
-          <ac:spMkLst>
-            <pc:docMk/>
-            <pc:sldMk cId="278083588" sldId="267"/>
-            <ac:spMk id="466" creationId="{00000000-0000-0000-0000-000000000000}"/>
-          </ac:spMkLst>
-        </pc:spChg>
-        <pc:picChg chg="del">
-          <ac:chgData name="elodiecslawinski@gmail.com" userId="2d9956b1ce3ed99c" providerId="LiveId" clId="{79719C05-BB10-4FCC-B2CE-0EC3DC887679}" dt="2021-09-25T15:03:56.989" v="269" actId="478"/>
-          <ac:picMkLst>
-            <pc:docMk/>
-            <pc:sldMk cId="278083588" sldId="267"/>
-            <ac:picMk id="4" creationId="{B29FA1EC-E4F3-4546-B034-BC2CAFC5F270}"/>
-          </ac:picMkLst>
-        </pc:picChg>
-        <pc:picChg chg="add mod">
-          <ac:chgData name="elodiecslawinski@gmail.com" userId="2d9956b1ce3ed99c" providerId="LiveId" clId="{79719C05-BB10-4FCC-B2CE-0EC3DC887679}" dt="2021-09-25T15:08:27.738" v="662" actId="1036"/>
-          <ac:picMkLst>
-            <pc:docMk/>
-            <pc:sldMk cId="278083588" sldId="267"/>
-            <ac:picMk id="5" creationId="{EDD5971F-437C-4BBA-A3FB-87DBBD3E945D}"/>
-          </ac:picMkLst>
-        </pc:picChg>
-      </pc:sldChg>
-      <pc:sldChg chg="addSp delSp modSp add del mod">
-        <pc:chgData name="elodiecslawinski@gmail.com" userId="2d9956b1ce3ed99c" providerId="LiveId" clId="{79719C05-BB10-4FCC-B2CE-0EC3DC887679}" dt="2021-09-25T15:02:14.183" v="200" actId="47"/>
-        <pc:sldMkLst>
-          <pc:docMk/>
-          <pc:sldMk cId="3819131231" sldId="267"/>
-        </pc:sldMkLst>
-        <pc:spChg chg="mod">
-          <ac:chgData name="elodiecslawinski@gmail.com" userId="2d9956b1ce3ed99c" providerId="LiveId" clId="{79719C05-BB10-4FCC-B2CE-0EC3DC887679}" dt="2021-09-25T13:41:55.100" v="192" actId="20577"/>
-          <ac:spMkLst>
-            <pc:docMk/>
-            <pc:sldMk cId="3819131231" sldId="267"/>
-            <ac:spMk id="464" creationId="{00000000-0000-0000-0000-000000000000}"/>
-          </ac:spMkLst>
-        </pc:spChg>
-        <pc:spChg chg="mod">
-          <ac:chgData name="elodiecslawinski@gmail.com" userId="2d9956b1ce3ed99c" providerId="LiveId" clId="{79719C05-BB10-4FCC-B2CE-0EC3DC887679}" dt="2021-09-25T13:42:21.696" v="195" actId="20577"/>
-          <ac:spMkLst>
-            <pc:docMk/>
-            <pc:sldMk cId="3819131231" sldId="267"/>
-            <ac:spMk id="465" creationId="{00000000-0000-0000-0000-000000000000}"/>
-          </ac:spMkLst>
-        </pc:spChg>
-        <pc:graphicFrameChg chg="add del">
-          <ac:chgData name="elodiecslawinski@gmail.com" userId="2d9956b1ce3ed99c" providerId="LiveId" clId="{79719C05-BB10-4FCC-B2CE-0EC3DC887679}" dt="2021-09-25T13:43:42.702" v="199"/>
-          <ac:graphicFrameMkLst>
-            <pc:docMk/>
-            <pc:sldMk cId="3819131231" sldId="267"/>
-            <ac:graphicFrameMk id="2" creationId="{A7D013E8-D6DF-4000-8459-2716855D622C}"/>
-          </ac:graphicFrameMkLst>
-        </pc:graphicFrameChg>
-        <pc:picChg chg="del">
-          <ac:chgData name="elodiecslawinski@gmail.com" userId="2d9956b1ce3ed99c" providerId="LiveId" clId="{79719C05-BB10-4FCC-B2CE-0EC3DC887679}" dt="2021-09-25T13:43:04.424" v="196" actId="478"/>
-          <ac:picMkLst>
-            <pc:docMk/>
-            <pc:sldMk cId="3819131231" sldId="267"/>
-            <ac:picMk id="467" creationId="{00000000-0000-0000-0000-000000000000}"/>
-          </ac:picMkLst>
-        </pc:picChg>
-      </pc:sldChg>
-      <pc:sldChg chg="addSp delSp modSp add mod">
-        <pc:chgData name="elodiecslawinski@gmail.com" userId="2d9956b1ce3ed99c" providerId="LiveId" clId="{79719C05-BB10-4FCC-B2CE-0EC3DC887679}" dt="2021-09-25T15:10:10.762" v="840" actId="948"/>
-        <pc:sldMkLst>
-          <pc:docMk/>
-          <pc:sldMk cId="1111481105" sldId="268"/>
-        </pc:sldMkLst>
-        <pc:spChg chg="mod">
-          <ac:chgData name="elodiecslawinski@gmail.com" userId="2d9956b1ce3ed99c" providerId="LiveId" clId="{79719C05-BB10-4FCC-B2CE-0EC3DC887679}" dt="2021-09-25T15:07:48.453" v="643" actId="20577"/>
-          <ac:spMkLst>
-            <pc:docMk/>
-            <pc:sldMk cId="1111481105" sldId="268"/>
-            <ac:spMk id="15" creationId="{D77A808B-59FF-4693-9381-96D6E713FB7D}"/>
-          </ac:spMkLst>
-        </pc:spChg>
-        <pc:spChg chg="mod">
-          <ac:chgData name="elodiecslawinski@gmail.com" userId="2d9956b1ce3ed99c" providerId="LiveId" clId="{79719C05-BB10-4FCC-B2CE-0EC3DC887679}" dt="2021-09-25T15:10:10.762" v="840" actId="948"/>
-          <ac:spMkLst>
-            <pc:docMk/>
-            <pc:sldMk cId="1111481105" sldId="268"/>
-            <ac:spMk id="16" creationId="{14C7CA51-417C-46E3-BA84-AA664C9C39A8}"/>
-          </ac:spMkLst>
-        </pc:spChg>
-        <pc:picChg chg="add mod">
-          <ac:chgData name="elodiecslawinski@gmail.com" userId="2d9956b1ce3ed99c" providerId="LiveId" clId="{79719C05-BB10-4FCC-B2CE-0EC3DC887679}" dt="2021-09-25T15:08:32.510" v="670" actId="1036"/>
-          <ac:picMkLst>
-            <pc:docMk/>
-            <pc:sldMk cId="1111481105" sldId="268"/>
-            <ac:picMk id="4" creationId="{F1CB69F3-F12E-49EA-8E0A-E234207A4C94}"/>
-          </ac:picMkLst>
-        </pc:picChg>
-        <pc:picChg chg="del">
-          <ac:chgData name="elodiecslawinski@gmail.com" userId="2d9956b1ce3ed99c" providerId="LiveId" clId="{79719C05-BB10-4FCC-B2CE-0EC3DC887679}" dt="2021-09-25T15:07:27.798" v="597" actId="478"/>
-          <ac:picMkLst>
-            <pc:docMk/>
-            <pc:sldMk cId="1111481105" sldId="268"/>
-            <ac:picMk id="5" creationId="{EDD5971F-437C-4BBA-A3FB-87DBBD3E945D}"/>
-          </ac:picMkLst>
-        </pc:picChg>
-      </pc:sldChg>
-      <pc:sldChg chg="add">
-        <pc:chgData name="elodiecslawinski@gmail.com" userId="2d9956b1ce3ed99c" providerId="LiveId" clId="{79719C05-BB10-4FCC-B2CE-0EC3DC887679}" dt="2021-09-25T15:10:40.129" v="841" actId="2890"/>
-        <pc:sldMkLst>
-          <pc:docMk/>
-          <pc:sldMk cId="3714457294" sldId="269"/>
-        </pc:sldMkLst>
-      </pc:sldChg>
-    </pc:docChg>
-  </pc:docChgLst>
-</pc:chgInfo>
 </file>
 
 <file path=ppt/notesMasters/notesMaster1.xml><?xml version="1.0" encoding="utf-8"?>
@@ -3987,6 +3038,31 @@
             </a:r>
           </a:p>
           <a:p>
+            <a:pPr marL="171450" marR="0" lvl="0" indent="-171450" algn="l" defTabSz="914400" rtl="0" eaLnBrk="1" fontAlgn="auto" latinLnBrk="0" hangingPunct="1">
+              <a:lnSpc>
+                <a:spcPct val="100000"/>
+              </a:lnSpc>
+              <a:spcBef>
+                <a:spcPts val="0"/>
+              </a:spcBef>
+              <a:spcAft>
+                <a:spcPts val="0"/>
+              </a:spcAft>
+              <a:buClr>
+                <a:srgbClr val="000000"/>
+              </a:buClr>
+              <a:buSzPts val="1100"/>
+              <a:buFontTx/>
+              <a:buChar char="-"/>
+              <a:tabLst/>
+              <a:defRPr/>
+            </a:pPr>
+            <a:r>
+              <a:rPr lang="en-US" dirty="0"/>
+              <a:t>We were curious to see how AQI has evolved over the last ~ 12 months, throughout COVID with the reduction of traffic</a:t>
+            </a:r>
+          </a:p>
+          <a:p>
             <a:pPr marL="171450" lvl="0" indent="-171450" algn="l" rtl="0">
               <a:spcBef>
                 <a:spcPts val="0"/>
@@ -4016,22 +3092,6 @@
             <a:r>
               <a:rPr lang="en-US" dirty="0"/>
               <a:t>It is measured from 1 to 5, with 5 being the worst air quality</a:t>
-            </a:r>
-          </a:p>
-          <a:p>
-            <a:pPr marL="171450" lvl="0" indent="-171450" algn="l" rtl="0">
-              <a:spcBef>
-                <a:spcPts val="0"/>
-              </a:spcBef>
-              <a:spcAft>
-                <a:spcPts val="0"/>
-              </a:spcAft>
-              <a:buFontTx/>
-              <a:buChar char="-"/>
-            </a:pPr>
-            <a:r>
-              <a:rPr lang="en-US" dirty="0"/>
-              <a:t>We were curious to see how AQI has evolved over the last ~ 12 months, throughout COVID with the reduction of traffic</a:t>
             </a:r>
           </a:p>
           <a:p>
@@ -4485,6 +3545,36 @@
                   <a:srgbClr val="FFFFFF"/>
                 </a:highlight>
               </a:rPr>
+              <a:t>(From  README)</a:t>
+            </a:r>
+          </a:p>
+          <a:p>
+            <a:pPr marL="0" lvl="0" indent="0" algn="l" rtl="0">
+              <a:lnSpc>
+                <a:spcPct val="115000"/>
+              </a:lnSpc>
+              <a:spcBef>
+                <a:spcPts val="1200"/>
+              </a:spcBef>
+              <a:spcAft>
+                <a:spcPts val="0"/>
+              </a:spcAft>
+              <a:buClr>
+                <a:schemeClr val="dk1"/>
+              </a:buClr>
+              <a:buSzPts val="1100"/>
+              <a:buFont typeface="Arial"/>
+              <a:buNone/>
+            </a:pPr>
+            <a:r>
+              <a:rPr lang="en" dirty="0">
+                <a:solidFill>
+                  <a:schemeClr val="dk1"/>
+                </a:solidFill>
+                <a:highlight>
+                  <a:srgbClr val="FFFFFF"/>
+                </a:highlight>
+              </a:rPr>
               <a:t>✓ Description of the data exploration phase of the project:</a:t>
             </a:r>
             <a:endParaRPr dirty="0">
@@ -4508,7 +3598,37 @@
             </a:pPr>
             <a:r>
               <a:rPr lang="en" dirty="0"/>
-              <a:t>After settling on a topic we found interesting and relevant, we tried to google and research data that aligned with our interests. We found lots of sources and projects done for India, and then more specific cities elsewhere, but not what we wanted in terms of measurements from our area. We found what we thought was perfect source from the EPA, but ran into technical issues working with it’s API when trying to collect information past one day’s worth of data. Then we found OpenWeather AQI API, looked into the documentation, the data samples, the lat/long way to tailor data outputs. After pairing it with a google data set of 51 lat/longs across the US, we were able to explore different options for pairing down our sample.</a:t>
+              <a:t>After settling on a topic we found interesting and relevant, we tried to google and research data that aligned with our interests. </a:t>
+            </a:r>
+          </a:p>
+          <a:p>
+            <a:pPr marL="0" lvl="0" indent="0" algn="l" rtl="0">
+              <a:spcBef>
+                <a:spcPts val="1200"/>
+              </a:spcBef>
+              <a:spcAft>
+                <a:spcPts val="0"/>
+              </a:spcAft>
+              <a:buNone/>
+            </a:pPr>
+            <a:r>
+              <a:rPr lang="en" dirty="0"/>
+              <a:t>We found lots of sources and projects done for India, and then more specific cities elsewhere, but not what we wanted in terms of measurements from our area. We found what we thought was perfect source from the EPA, but ran into technical issues working with it’s API when trying to collect information past one day’s worth of data. </a:t>
+            </a:r>
+          </a:p>
+          <a:p>
+            <a:pPr marL="0" lvl="0" indent="0" algn="l" rtl="0">
+              <a:spcBef>
+                <a:spcPts val="1200"/>
+              </a:spcBef>
+              <a:spcAft>
+                <a:spcPts val="0"/>
+              </a:spcAft>
+              <a:buNone/>
+            </a:pPr>
+            <a:r>
+              <a:rPr lang="en" dirty="0"/>
+              <a:t>Then we found OpenWeather AQI API, looked into the documentation, the data samples, the lat/long way to tailor data outputs. After pairing it with a google data set of 51 lat/longs across the US, we were able to explore different options for pairing down our sample.</a:t>
             </a:r>
             <a:endParaRPr dirty="0"/>
           </a:p>
@@ -44849,8 +43969,8 @@
         </p:nvSpPr>
         <p:spPr>
           <a:xfrm>
-            <a:off x="5214162" y="630000"/>
-            <a:ext cx="3924000" cy="1006500"/>
+            <a:off x="1381539" y="429644"/>
+            <a:ext cx="6553988" cy="1006500"/>
           </a:xfrm>
           <a:prstGeom prst="rect">
             <a:avLst/>
@@ -45135,8 +44255,8 @@
         </p:nvSpPr>
         <p:spPr>
           <a:xfrm>
-            <a:off x="5093074" y="629975"/>
-            <a:ext cx="3766800" cy="1006500"/>
+            <a:off x="675861" y="629975"/>
+            <a:ext cx="8184013" cy="1006500"/>
           </a:xfrm>
           <a:prstGeom prst="rect">
             <a:avLst/>
@@ -45200,7 +44320,7 @@
         </p:blipFill>
         <p:spPr>
           <a:xfrm>
-            <a:off x="7819" y="1070504"/>
+            <a:off x="0" y="1510854"/>
             <a:ext cx="4704073" cy="3002671"/>
           </a:xfrm>
           <a:prstGeom prst="rect">
@@ -45903,8 +45023,8 @@
         </p:nvSpPr>
         <p:spPr>
           <a:xfrm>
-            <a:off x="5214162" y="630000"/>
-            <a:ext cx="3924000" cy="1006500"/>
+            <a:off x="632003" y="282073"/>
+            <a:ext cx="7995162" cy="1006500"/>
           </a:xfrm>
           <a:prstGeom prst="rect">
             <a:avLst/>
@@ -46209,7 +45329,7 @@
         </p:blipFill>
         <p:spPr>
           <a:xfrm>
-            <a:off x="0" y="1665897"/>
+            <a:off x="0" y="1486993"/>
             <a:ext cx="5340096" cy="2781882"/>
           </a:xfrm>
           <a:prstGeom prst="rect">
@@ -46235,8 +45355,8 @@
         </p:nvSpPr>
         <p:spPr>
           <a:xfrm>
-            <a:off x="5214162" y="630000"/>
-            <a:ext cx="3924000" cy="1006500"/>
+            <a:off x="820846" y="159823"/>
+            <a:ext cx="7806319" cy="1006500"/>
           </a:xfrm>
           <a:prstGeom prst="rect">
             <a:avLst/>
@@ -46303,8 +45423,8 @@
         </p:nvSpPr>
         <p:spPr>
           <a:xfrm>
-            <a:off x="5506280" y="1976424"/>
-            <a:ext cx="3339764" cy="3065400"/>
+            <a:off x="5506279" y="1976424"/>
+            <a:ext cx="3575447" cy="3065400"/>
           </a:xfrm>
           <a:prstGeom prst="rect">
             <a:avLst/>
@@ -47120,6 +46240,138 @@
           </a:p>
         </p:txBody>
       </p:sp>
+      <p:pic>
+        <p:nvPicPr>
+          <p:cNvPr id="5" name="Google Shape;476;p75">
+            <a:extLst>
+              <a:ext uri="{FF2B5EF4-FFF2-40B4-BE49-F238E27FC236}">
+                <a16:creationId xmlns:a16="http://schemas.microsoft.com/office/drawing/2014/main" id="{7B53F363-13B0-A447-9F04-A314DA0CD223}"/>
+              </a:ext>
+            </a:extLst>
+          </p:cNvPr>
+          <p:cNvPicPr preferRelativeResize="0"/>
+          <p:nvPr/>
+        </p:nvPicPr>
+        <p:blipFill rotWithShape="1">
+          <a:blip r:embed="rId3">
+            <a:alphaModFix/>
+          </a:blip>
+          <a:srcRect t="4191" b="5076"/>
+          <a:stretch/>
+        </p:blipFill>
+        <p:spPr>
+          <a:xfrm>
+            <a:off x="0" y="2788911"/>
+            <a:ext cx="2903232" cy="2126148"/>
+          </a:xfrm>
+          <a:prstGeom prst="rect">
+            <a:avLst/>
+          </a:prstGeom>
+          <a:noFill/>
+          <a:ln>
+            <a:noFill/>
+          </a:ln>
+        </p:spPr>
+      </p:pic>
+      <p:pic>
+        <p:nvPicPr>
+          <p:cNvPr id="8" name="Google Shape;476;p75">
+            <a:extLst>
+              <a:ext uri="{FF2B5EF4-FFF2-40B4-BE49-F238E27FC236}">
+                <a16:creationId xmlns:a16="http://schemas.microsoft.com/office/drawing/2014/main" id="{661B1B80-8423-6746-A2B1-3356D7A641FF}"/>
+              </a:ext>
+            </a:extLst>
+          </p:cNvPr>
+          <p:cNvPicPr preferRelativeResize="0"/>
+          <p:nvPr/>
+        </p:nvPicPr>
+        <p:blipFill rotWithShape="1">
+          <a:blip r:embed="rId3">
+            <a:alphaModFix/>
+          </a:blip>
+          <a:srcRect t="4191" b="5076"/>
+          <a:stretch/>
+        </p:blipFill>
+        <p:spPr>
+          <a:xfrm>
+            <a:off x="2903231" y="2788911"/>
+            <a:ext cx="2865929" cy="2126148"/>
+          </a:xfrm>
+          <a:prstGeom prst="rect">
+            <a:avLst/>
+          </a:prstGeom>
+          <a:noFill/>
+          <a:ln>
+            <a:noFill/>
+          </a:ln>
+        </p:spPr>
+      </p:pic>
+      <p:pic>
+        <p:nvPicPr>
+          <p:cNvPr id="9" name="Google Shape;476;p75">
+            <a:extLst>
+              <a:ext uri="{FF2B5EF4-FFF2-40B4-BE49-F238E27FC236}">
+                <a16:creationId xmlns:a16="http://schemas.microsoft.com/office/drawing/2014/main" id="{6FCDEA09-F115-CC41-85C9-03462CD57DA6}"/>
+              </a:ext>
+            </a:extLst>
+          </p:cNvPr>
+          <p:cNvPicPr preferRelativeResize="0"/>
+          <p:nvPr/>
+        </p:nvPicPr>
+        <p:blipFill rotWithShape="1">
+          <a:blip r:embed="rId3">
+            <a:alphaModFix/>
+          </a:blip>
+          <a:srcRect t="4191" b="5076"/>
+          <a:stretch/>
+        </p:blipFill>
+        <p:spPr>
+          <a:xfrm>
+            <a:off x="27959" y="419165"/>
+            <a:ext cx="2875273" cy="1935425"/>
+          </a:xfrm>
+          <a:prstGeom prst="rect">
+            <a:avLst/>
+          </a:prstGeom>
+          <a:noFill/>
+          <a:ln>
+            <a:noFill/>
+          </a:ln>
+        </p:spPr>
+      </p:pic>
+      <p:pic>
+        <p:nvPicPr>
+          <p:cNvPr id="10" name="Google Shape;476;p75">
+            <a:extLst>
+              <a:ext uri="{FF2B5EF4-FFF2-40B4-BE49-F238E27FC236}">
+                <a16:creationId xmlns:a16="http://schemas.microsoft.com/office/drawing/2014/main" id="{BCF3A7FB-30AE-C647-A0B2-A51A5101D842}"/>
+              </a:ext>
+            </a:extLst>
+          </p:cNvPr>
+          <p:cNvPicPr preferRelativeResize="0"/>
+          <p:nvPr/>
+        </p:nvPicPr>
+        <p:blipFill rotWithShape="1">
+          <a:blip r:embed="rId3">
+            <a:alphaModFix/>
+          </a:blip>
+          <a:srcRect t="4191" b="5076"/>
+          <a:stretch/>
+        </p:blipFill>
+        <p:spPr>
+          <a:xfrm>
+            <a:off x="2903230" y="419166"/>
+            <a:ext cx="2865929" cy="1935424"/>
+          </a:xfrm>
+          <a:prstGeom prst="rect">
+            <a:avLst/>
+          </a:prstGeom>
+          <a:noFill/>
+          <a:ln>
+            <a:noFill/>
+          </a:ln>
+        </p:spPr>
+      </p:pic>
     </p:spTree>
     <p:extLst>
       <p:ext uri="{BB962C8B-B14F-4D97-AF65-F5344CB8AC3E}">
@@ -47912,8 +47164,8 @@
         </p:nvSpPr>
         <p:spPr>
           <a:xfrm>
-            <a:off x="4746177" y="4108303"/>
-            <a:ext cx="1888200" cy="687234"/>
+            <a:off x="4572000" y="4108303"/>
+            <a:ext cx="2417783" cy="821506"/>
           </a:xfrm>
           <a:prstGeom prst="rect">
             <a:avLst/>
@@ -47949,9 +47201,9 @@
               <a:rPr lang="en-US" sz="1100" dirty="0">
                 <a:hlinkClick r:id="rId6"/>
               </a:rPr>
-              <a:t>michellereilly@gmail.com</a:t>
+              <a:t>michelleeileenreilly@gmail.com</a:t>
             </a:r>
-            <a:endParaRPr lang="en-US" sz="1100" dirty="0"/>
+            <a:endParaRPr lang="en-US" dirty="0"/>
           </a:p>
           <a:p>
             <a:pPr marL="0" lvl="0" indent="0" algn="ctr" rtl="0">
@@ -47971,10 +47223,10 @@
               <a:buNone/>
             </a:pPr>
             <a:r>
-              <a:rPr lang="en-US" dirty="0"/>
+              <a:rPr lang="en-US" sz="1400" dirty="0"/>
               <a:t>+1-305-965-0030</a:t>
             </a:r>
-            <a:endParaRPr sz="1100" dirty="0"/>
+            <a:endParaRPr sz="1400" dirty="0"/>
           </a:p>
         </p:txBody>
       </p:sp>
@@ -48249,12 +47501,12 @@
               <a:buSzPts val="1100"/>
             </a:pPr>
             <a:r>
-              <a:rPr lang="en-US" sz="1100">
+              <a:rPr lang="en-US" sz="1100" dirty="0">
                 <a:hlinkClick r:id="rId7"/>
               </a:rPr>
               <a:t>elodiecslawinski@gmail.com</a:t>
             </a:r>
-            <a:endParaRPr lang="en-US" sz="1100"/>
+            <a:endParaRPr lang="en-US" sz="1100" dirty="0"/>
           </a:p>
           <a:p>
             <a:pPr algn="ctr">
@@ -48267,7 +47519,7 @@
               <a:buSzPts val="1100"/>
             </a:pPr>
             <a:r>
-              <a:rPr lang="en-US"/>
+              <a:rPr lang="en-US" dirty="0"/>
               <a:t>+1-240-481-2175</a:t>
             </a:r>
             <a:endParaRPr lang="en-US" sz="1100" dirty="0"/>
@@ -51143,8 +50395,8 @@
         </p:nvSpPr>
         <p:spPr>
           <a:xfrm>
-            <a:off x="5214162" y="630000"/>
-            <a:ext cx="3924000" cy="1006500"/>
+            <a:off x="646168" y="346477"/>
+            <a:ext cx="8094428" cy="1006500"/>
           </a:xfrm>
           <a:prstGeom prst="rect">
             <a:avLst/>

</xml_diff>

<commit_message>
Updates Michelle 09-26-2021 Segment 3 Final
</commit_message>
<xml_diff>
--- a/OpenWeather_AQI_Presentation_Final.pptx
+++ b/OpenWeather_AQI_Presentation_Final.pptx
@@ -2138,58 +2138,8 @@
             </a:pPr>
             <a:r>
               <a:rPr lang="en-US" dirty="0"/>
-              <a:t>ADD</a:t>
+              <a:t>We believe that it would be worth making this more dynamic for future research using the full advantage of the links</a:t>
             </a:r>
-          </a:p>
-          <a:p>
-            <a:pPr marL="0" marR="0" lvl="0" indent="0" algn="l" defTabSz="914400" rtl="0" eaLnBrk="1" fontAlgn="auto" latinLnBrk="0" hangingPunct="1">
-              <a:lnSpc>
-                <a:spcPct val="100000"/>
-              </a:lnSpc>
-              <a:spcBef>
-                <a:spcPts val="0"/>
-              </a:spcBef>
-              <a:spcAft>
-                <a:spcPts val="0"/>
-              </a:spcAft>
-              <a:buClr>
-                <a:srgbClr val="000000"/>
-              </a:buClr>
-              <a:buSzPts val="1100"/>
-              <a:buFont typeface="Arial"/>
-              <a:buNone/>
-              <a:tabLst/>
-              <a:defRPr/>
-            </a:pPr>
-            <a:endParaRPr lang="en-US" dirty="0"/>
-          </a:p>
-          <a:p>
-            <a:pPr marL="0" lvl="0" indent="0" algn="l" rtl="0">
-              <a:spcBef>
-                <a:spcPts val="0"/>
-              </a:spcBef>
-              <a:spcAft>
-                <a:spcPts val="0"/>
-              </a:spcAft>
-              <a:buNone/>
-            </a:pPr>
-            <a:endParaRPr lang="en-US" dirty="0"/>
-          </a:p>
-          <a:p>
-            <a:pPr marL="0" lvl="0" indent="0" algn="l" rtl="0">
-              <a:spcBef>
-                <a:spcPts val="0"/>
-              </a:spcBef>
-              <a:spcAft>
-                <a:spcPts val="0"/>
-              </a:spcAft>
-              <a:buNone/>
-            </a:pPr>
-            <a:r>
-              <a:rPr lang="en-US" dirty="0"/>
-              <a:t>Add other slide</a:t>
-            </a:r>
-            <a:endParaRPr dirty="0"/>
           </a:p>
         </p:txBody>
       </p:sp>
@@ -46420,7 +46370,7 @@
         </p:nvSpPr>
         <p:spPr>
           <a:xfrm>
-            <a:off x="1549050" y="728850"/>
+            <a:off x="1549050" y="400295"/>
             <a:ext cx="6045900" cy="1842900"/>
           </a:xfrm>
           <a:prstGeom prst="rect">
@@ -46778,10 +46728,9 @@
               <a:buSzPts val="1200"/>
             </a:pPr>
             <a:r>
-              <a:rPr lang="en-US" sz="1100"/>
+              <a:rPr lang="en-US" dirty="0"/>
               <a:t>Michelle Reilly</a:t>
             </a:r>
-            <a:endParaRPr lang="en-US" sz="1100" dirty="0"/>
           </a:p>
         </p:txBody>
       </p:sp>
@@ -47056,14 +47005,14 @@
               <a:buSzPts val="1200"/>
             </a:pPr>
             <a:r>
-              <a:rPr lang="en-US" sz="1100" dirty="0"/>
+              <a:rPr lang="en-US" dirty="0"/>
               <a:t>Elodie </a:t>
             </a:r>
             <a:r>
-              <a:rPr lang="en-US" sz="1100" dirty="0" err="1"/>
+              <a:rPr lang="en-US" dirty="0" err="1"/>
               <a:t>Slawinski</a:t>
             </a:r>
-            <a:endParaRPr lang="en-US" sz="1100" dirty="0"/>
+            <a:endParaRPr lang="en-US" dirty="0"/>
           </a:p>
         </p:txBody>
       </p:sp>

</xml_diff>